<commit_message>
Add : ppt 발표자료
2022-05-15
</commit_message>
<xml_diff>
--- a/2022-05-15/김도현/안드 스터디 - 코틀린.pptx
+++ b/2022-05-15/김도현/안드 스터디 - 코틀린.pptx
@@ -11,11 +11,13 @@
     <p:sldId id="259" r:id="rId5"/>
     <p:sldId id="263" r:id="rId6"/>
     <p:sldId id="264" r:id="rId7"/>
-    <p:sldId id="266" r:id="rId8"/>
-    <p:sldId id="265" r:id="rId9"/>
-    <p:sldId id="261" r:id="rId10"/>
+    <p:sldId id="265" r:id="rId8"/>
+    <p:sldId id="261" r:id="rId9"/>
+    <p:sldId id="266" r:id="rId10"/>
     <p:sldId id="260" r:id="rId11"/>
-    <p:sldId id="262" r:id="rId12"/>
+    <p:sldId id="267" r:id="rId12"/>
+    <p:sldId id="268" r:id="rId13"/>
+    <p:sldId id="262" r:id="rId14"/>
   </p:sldIdLst>
   <p:sldSz cx="12192000" cy="6858000"/>
   <p:notesSz cx="6858000" cy="9144000"/>
@@ -114,6 +116,11 @@
       </a:defRPr>
     </a:lvl9pPr>
   </p:defaultTextStyle>
+  <p:extLst>
+    <p:ext uri="{EFAFB233-063F-42B5-8137-9DF3F51BA10A}">
+      <p15:sldGuideLst xmlns:p15="http://schemas.microsoft.com/office/powerpoint/2012/main"/>
+    </p:ext>
+  </p:extLst>
 </p:presentation>
 </file>
 
@@ -871,7 +878,7 @@
           <a:p>
             <a:fld id="{4F0F50AC-F678-4962-B972-25DE77955650}" type="datetimeFigureOut">
               <a:rPr lang="ko-KR" altLang="en-US" smtClean="0"/>
-              <a:t>2022-05-14</a:t>
+              <a:t>2022-05-15</a:t>
             </a:fld>
             <a:endParaRPr lang="ko-KR" altLang="en-US"/>
           </a:p>
@@ -1308,7 +1315,7 @@
           <a:p>
             <a:fld id="{4F0F50AC-F678-4962-B972-25DE77955650}" type="datetimeFigureOut">
               <a:rPr lang="ko-KR" altLang="en-US" smtClean="0"/>
-              <a:t>2022-05-14</a:t>
+              <a:t>2022-05-15</a:t>
             </a:fld>
             <a:endParaRPr lang="ko-KR" altLang="en-US"/>
           </a:p>
@@ -2359,7 +2366,7 @@
           <a:p>
             <a:fld id="{4F0F50AC-F678-4962-B972-25DE77955650}" type="datetimeFigureOut">
               <a:rPr lang="ko-KR" altLang="en-US" smtClean="0"/>
-              <a:t>2022-05-14</a:t>
+              <a:t>2022-05-15</a:t>
             </a:fld>
             <a:endParaRPr lang="ko-KR" altLang="en-US"/>
           </a:p>
@@ -2549,7 +2556,7 @@
           <a:p>
             <a:fld id="{4F0F50AC-F678-4962-B972-25DE77955650}" type="datetimeFigureOut">
               <a:rPr lang="ko-KR" altLang="en-US" smtClean="0"/>
-              <a:t>2022-05-14</a:t>
+              <a:t>2022-05-15</a:t>
             </a:fld>
             <a:endParaRPr lang="ko-KR" altLang="en-US"/>
           </a:p>
@@ -3071,7 +3078,7 @@
           <a:p>
             <a:fld id="{4F0F50AC-F678-4962-B972-25DE77955650}" type="datetimeFigureOut">
               <a:rPr lang="ko-KR" altLang="en-US" smtClean="0"/>
-              <a:t>2022-05-14</a:t>
+              <a:t>2022-05-15</a:t>
             </a:fld>
             <a:endParaRPr lang="ko-KR" altLang="en-US"/>
           </a:p>
@@ -3508,7 +3515,7 @@
           <a:p>
             <a:fld id="{4F0F50AC-F678-4962-B972-25DE77955650}" type="datetimeFigureOut">
               <a:rPr lang="ko-KR" altLang="en-US" smtClean="0"/>
-              <a:t>2022-05-14</a:t>
+              <a:t>2022-05-15</a:t>
             </a:fld>
             <a:endParaRPr lang="ko-KR" altLang="en-US"/>
           </a:p>
@@ -4202,7 +4209,7 @@
           <a:p>
             <a:fld id="{4F0F50AC-F678-4962-B972-25DE77955650}" type="datetimeFigureOut">
               <a:rPr lang="ko-KR" altLang="en-US" smtClean="0"/>
-              <a:t>2022-05-14</a:t>
+              <a:t>2022-05-15</a:t>
             </a:fld>
             <a:endParaRPr lang="ko-KR" altLang="en-US"/>
           </a:p>
@@ -4541,7 +4548,7 @@
           <a:p>
             <a:fld id="{4F0F50AC-F678-4962-B972-25DE77955650}" type="datetimeFigureOut">
               <a:rPr lang="ko-KR" altLang="en-US" smtClean="0"/>
-              <a:t>2022-05-14</a:t>
+              <a:t>2022-05-15</a:t>
             </a:fld>
             <a:endParaRPr lang="ko-KR" altLang="en-US"/>
           </a:p>
@@ -4820,7 +4827,7 @@
           <a:p>
             <a:fld id="{4F0F50AC-F678-4962-B972-25DE77955650}" type="datetimeFigureOut">
               <a:rPr lang="ko-KR" altLang="en-US" smtClean="0"/>
-              <a:t>2022-05-14</a:t>
+              <a:t>2022-05-15</a:t>
             </a:fld>
             <a:endParaRPr lang="ko-KR" altLang="en-US"/>
           </a:p>
@@ -5472,7 +5479,7 @@
           <a:p>
             <a:fld id="{4F0F50AC-F678-4962-B972-25DE77955650}" type="datetimeFigureOut">
               <a:rPr lang="ko-KR" altLang="en-US" smtClean="0"/>
-              <a:t>2022-05-14</a:t>
+              <a:t>2022-05-15</a:t>
             </a:fld>
             <a:endParaRPr lang="ko-KR" altLang="en-US"/>
           </a:p>
@@ -5897,7 +5904,7 @@
           <a:p>
             <a:fld id="{4F0F50AC-F678-4962-B972-25DE77955650}" type="datetimeFigureOut">
               <a:rPr lang="ko-KR" altLang="en-US" smtClean="0"/>
-              <a:t>2022-05-14</a:t>
+              <a:t>2022-05-15</a:t>
             </a:fld>
             <a:endParaRPr lang="ko-KR" altLang="en-US"/>
           </a:p>
@@ -10191,7 +10198,7 @@
           <a:p>
             <a:fld id="{4F0F50AC-F678-4962-B972-25DE77955650}" type="datetimeFigureOut">
               <a:rPr lang="ko-KR" altLang="en-US" smtClean="0"/>
-              <a:t>2022-05-14</a:t>
+              <a:t>2022-05-15</a:t>
             </a:fld>
             <a:endParaRPr lang="ko-KR" altLang="en-US"/>
           </a:p>
@@ -10843,8 +10850,8 @@
         </p:nvSpPr>
         <p:spPr>
           <a:xfrm>
-            <a:off x="899410" y="2563318"/>
-            <a:ext cx="9758597" cy="461665"/>
+            <a:off x="899410" y="2250052"/>
+            <a:ext cx="9758597" cy="4031873"/>
           </a:xfrm>
           <a:prstGeom prst="rect">
             <a:avLst/>
@@ -10858,26 +10865,243 @@
           <a:lstStyle/>
           <a:p>
             <a:r>
+              <a:rPr lang="en-US" altLang="ko-KR" sz="3200" dirty="0" err="1">
+                <a:latin typeface="나눔고딕 ExtraBold" panose="020D0904000000000000" pitchFamily="50" charset="-127"/>
+                <a:ea typeface="나눔고딕 ExtraBold" panose="020D0904000000000000" pitchFamily="50" charset="-127"/>
+              </a:rPr>
+              <a:t>val</a:t>
+            </a:r>
+            <a:r>
+              <a:rPr lang="en-US" altLang="ko-KR" sz="3200" dirty="0">
+                <a:latin typeface="나눔고딕 ExtraBold" panose="020D0904000000000000" pitchFamily="50" charset="-127"/>
+                <a:ea typeface="나눔고딕 ExtraBold" panose="020D0904000000000000" pitchFamily="50" charset="-127"/>
+              </a:rPr>
+              <a:t>,</a:t>
+            </a:r>
+            <a:r>
+              <a:rPr lang="ko-KR" altLang="en-US" sz="3200" dirty="0">
+                <a:latin typeface="나눔고딕 ExtraBold" panose="020D0904000000000000" pitchFamily="50" charset="-127"/>
+                <a:ea typeface="나눔고딕 ExtraBold" panose="020D0904000000000000" pitchFamily="50" charset="-127"/>
+              </a:rPr>
+              <a:t> </a:t>
+            </a:r>
+            <a:r>
+              <a:rPr lang="en-US" altLang="ko-KR" sz="3200" dirty="0">
+                <a:latin typeface="나눔고딕 ExtraBold" panose="020D0904000000000000" pitchFamily="50" charset="-127"/>
+                <a:ea typeface="나눔고딕 ExtraBold" panose="020D0904000000000000" pitchFamily="50" charset="-127"/>
+              </a:rPr>
+              <a:t>var</a:t>
+            </a:r>
+          </a:p>
+          <a:p>
+            <a:endParaRPr lang="en-US" altLang="ko-KR" sz="2400" dirty="0">
+              <a:latin typeface="나눔고딕 ExtraBold" panose="020D0904000000000000" pitchFamily="50" charset="-127"/>
+              <a:ea typeface="나눔고딕 ExtraBold" panose="020D0904000000000000" pitchFamily="50" charset="-127"/>
+            </a:endParaRPr>
+          </a:p>
+          <a:p>
+            <a:r>
+              <a:rPr lang="en-US" altLang="ko-KR" sz="2400" dirty="0" err="1">
+                <a:latin typeface="나눔고딕 ExtraBold" panose="020D0904000000000000" pitchFamily="50" charset="-127"/>
+                <a:ea typeface="나눔고딕 ExtraBold" panose="020D0904000000000000" pitchFamily="50" charset="-127"/>
+              </a:rPr>
+              <a:t>val</a:t>
+            </a:r>
+            <a:r>
+              <a:rPr lang="en-US" altLang="ko-KR" sz="2400" dirty="0">
+                <a:latin typeface="나눔고딕 ExtraBold" panose="020D0904000000000000" pitchFamily="50" charset="-127"/>
+                <a:ea typeface="나눔고딕 ExtraBold" panose="020D0904000000000000" pitchFamily="50" charset="-127"/>
+              </a:rPr>
+              <a:t>, var</a:t>
+            </a:r>
+            <a:r>
               <a:rPr lang="ko-KR" altLang="en-US" sz="2400" dirty="0">
                 <a:latin typeface="나눔고딕 ExtraBold" panose="020D0904000000000000" pitchFamily="50" charset="-127"/>
                 <a:ea typeface="나눔고딕 ExtraBold" panose="020D0904000000000000" pitchFamily="50" charset="-127"/>
               </a:rPr>
-              <a:t>함수 선언과 변수 선언</a:t>
+              <a:t>의 두가지 방법으로 변수를 선언한다</a:t>
             </a:r>
             <a:r>
               <a:rPr lang="en-US" altLang="ko-KR" sz="2400" dirty="0">
                 <a:latin typeface="나눔고딕 ExtraBold" panose="020D0904000000000000" pitchFamily="50" charset="-127"/>
                 <a:ea typeface="나눔고딕 ExtraBold" panose="020D0904000000000000" pitchFamily="50" charset="-127"/>
               </a:rPr>
-              <a:t>, </a:t>
+              <a:t>.</a:t>
+            </a:r>
+          </a:p>
+          <a:p>
+            <a:r>
+              <a:rPr lang="en-US" altLang="ko-KR" sz="2400" dirty="0" err="1">
+                <a:latin typeface="나눔고딕 ExtraBold" panose="020D0904000000000000" pitchFamily="50" charset="-127"/>
+                <a:ea typeface="나눔고딕 ExtraBold" panose="020D0904000000000000" pitchFamily="50" charset="-127"/>
+              </a:rPr>
+              <a:t>val</a:t>
+            </a:r>
+            <a:r>
+              <a:rPr lang="en-US" altLang="ko-KR" sz="2400" dirty="0">
+                <a:latin typeface="나눔고딕 ExtraBold" panose="020D0904000000000000" pitchFamily="50" charset="-127"/>
+                <a:ea typeface="나눔고딕 ExtraBold" panose="020D0904000000000000" pitchFamily="50" charset="-127"/>
+              </a:rPr>
+              <a:t>(value) </a:t>
             </a:r>
             <a:r>
               <a:rPr lang="ko-KR" altLang="en-US" sz="2400" dirty="0">
                 <a:latin typeface="나눔고딕 ExtraBold" panose="020D0904000000000000" pitchFamily="50" charset="-127"/>
                 <a:ea typeface="나눔고딕 ExtraBold" panose="020D0904000000000000" pitchFamily="50" charset="-127"/>
               </a:rPr>
-              <a:t>함수 타입과</a:t>
-            </a:r>
+              <a:t>초기값을 설정하고 나면 값을 바꾸지 못함</a:t>
+            </a:r>
+            <a:endParaRPr lang="en-US" altLang="ko-KR" sz="2400" dirty="0">
+              <a:latin typeface="나눔고딕 ExtraBold" panose="020D0904000000000000" pitchFamily="50" charset="-127"/>
+              <a:ea typeface="나눔고딕 ExtraBold" panose="020D0904000000000000" pitchFamily="50" charset="-127"/>
+            </a:endParaRPr>
+          </a:p>
+          <a:p>
+            <a:r>
+              <a:rPr lang="en-US" altLang="ko-KR" sz="2400" dirty="0">
+                <a:latin typeface="나눔고딕 ExtraBold" panose="020D0904000000000000" pitchFamily="50" charset="-127"/>
+                <a:ea typeface="나눔고딕 ExtraBold" panose="020D0904000000000000" pitchFamily="50" charset="-127"/>
+              </a:rPr>
+              <a:t>var(variable) </a:t>
+            </a:r>
+            <a:r>
+              <a:rPr lang="ko-KR" altLang="en-US" sz="2400" dirty="0">
+                <a:latin typeface="나눔고딕 ExtraBold" panose="020D0904000000000000" pitchFamily="50" charset="-127"/>
+                <a:ea typeface="나눔고딕 ExtraBold" panose="020D0904000000000000" pitchFamily="50" charset="-127"/>
+              </a:rPr>
+              <a:t>초기값을 설정해도 값을 바꿀 수 있음</a:t>
+            </a:r>
+            <a:r>
+              <a:rPr lang="en-US" altLang="ko-KR" sz="2400" dirty="0">
+                <a:latin typeface="나눔고딕 ExtraBold" panose="020D0904000000000000" pitchFamily="50" charset="-127"/>
+                <a:ea typeface="나눔고딕 ExtraBold" panose="020D0904000000000000" pitchFamily="50" charset="-127"/>
+              </a:rPr>
+              <a:t>.</a:t>
+            </a:r>
+          </a:p>
+          <a:p>
+            <a:endParaRPr lang="en-US" altLang="ko-KR" sz="2400" dirty="0">
+              <a:latin typeface="나눔고딕 ExtraBold" panose="020D0904000000000000" pitchFamily="50" charset="-127"/>
+              <a:ea typeface="나눔고딕 ExtraBold" panose="020D0904000000000000" pitchFamily="50" charset="-127"/>
+            </a:endParaRPr>
+          </a:p>
+          <a:p>
+            <a:r>
+              <a:rPr lang="ko-KR" altLang="en-US" sz="3200" dirty="0">
+                <a:latin typeface="나눔고딕 ExtraBold" panose="020D0904000000000000" pitchFamily="50" charset="-127"/>
+                <a:ea typeface="나눔고딕 ExtraBold" panose="020D0904000000000000" pitchFamily="50" charset="-127"/>
+              </a:rPr>
+              <a:t>변수 선언</a:t>
+            </a:r>
+            <a:endParaRPr lang="en-US" altLang="ko-KR" sz="3200" dirty="0">
+              <a:latin typeface="나눔고딕 ExtraBold" panose="020D0904000000000000" pitchFamily="50" charset="-127"/>
+              <a:ea typeface="나눔고딕 ExtraBold" panose="020D0904000000000000" pitchFamily="50" charset="-127"/>
+            </a:endParaRPr>
+          </a:p>
+          <a:p>
+            <a:endParaRPr lang="en-US" altLang="ko-KR" sz="2400" dirty="0">
+              <a:latin typeface="나눔고딕 ExtraBold" panose="020D0904000000000000" pitchFamily="50" charset="-127"/>
+              <a:ea typeface="나눔고딕 ExtraBold" panose="020D0904000000000000" pitchFamily="50" charset="-127"/>
+            </a:endParaRPr>
+          </a:p>
+          <a:p>
+            <a:r>
+              <a:rPr lang="en-US" altLang="ko-KR" sz="2400" dirty="0">
+                <a:latin typeface="나눔고딕 ExtraBold" panose="020D0904000000000000" pitchFamily="50" charset="-127"/>
+                <a:ea typeface="나눔고딕 ExtraBold" panose="020D0904000000000000" pitchFamily="50" charset="-127"/>
+              </a:rPr>
+              <a:t>[(</a:t>
+            </a:r>
+            <a:r>
+              <a:rPr lang="en-US" altLang="ko-KR" sz="2400" dirty="0" err="1">
+                <a:latin typeface="나눔고딕 ExtraBold" panose="020D0904000000000000" pitchFamily="50" charset="-127"/>
+                <a:ea typeface="나눔고딕 ExtraBold" panose="020D0904000000000000" pitchFamily="50" charset="-127"/>
+              </a:rPr>
+              <a:t>val</a:t>
+            </a:r>
+            <a:r>
+              <a:rPr lang="en-US" altLang="ko-KR" sz="2400" dirty="0">
+                <a:latin typeface="나눔고딕 ExtraBold" panose="020D0904000000000000" pitchFamily="50" charset="-127"/>
+                <a:ea typeface="나눔고딕 ExtraBold" panose="020D0904000000000000" pitchFamily="50" charset="-127"/>
+              </a:rPr>
+              <a:t>,</a:t>
+            </a:r>
+            <a:r>
+              <a:rPr lang="ko-KR" altLang="en-US" sz="2400" dirty="0">
+                <a:latin typeface="나눔고딕 ExtraBold" panose="020D0904000000000000" pitchFamily="50" charset="-127"/>
+                <a:ea typeface="나눔고딕 ExtraBold" panose="020D0904000000000000" pitchFamily="50" charset="-127"/>
+              </a:rPr>
+              <a:t> </a:t>
+            </a:r>
+            <a:r>
+              <a:rPr lang="en-US" altLang="ko-KR" sz="2400" dirty="0">
+                <a:latin typeface="나눔고딕 ExtraBold" panose="020D0904000000000000" pitchFamily="50" charset="-127"/>
+                <a:ea typeface="나눔고딕 ExtraBold" panose="020D0904000000000000" pitchFamily="50" charset="-127"/>
+              </a:rPr>
+              <a:t>var)</a:t>
+            </a:r>
+            <a:r>
+              <a:rPr lang="ko-KR" altLang="en-US" sz="2400" dirty="0">
+                <a:latin typeface="나눔고딕 ExtraBold" panose="020D0904000000000000" pitchFamily="50" charset="-127"/>
+                <a:ea typeface="나눔고딕 ExtraBold" panose="020D0904000000000000" pitchFamily="50" charset="-127"/>
+              </a:rPr>
+              <a:t> </a:t>
+            </a:r>
+            <a:r>
+              <a:rPr lang="en-US" altLang="ko-KR" sz="2400" dirty="0">
+                <a:latin typeface="나눔고딕 ExtraBold" panose="020D0904000000000000" pitchFamily="50" charset="-127"/>
+                <a:ea typeface="나눔고딕 ExtraBold" panose="020D0904000000000000" pitchFamily="50" charset="-127"/>
+              </a:rPr>
+              <a:t> </a:t>
+            </a:r>
+            <a:r>
+              <a:rPr lang="ko-KR" altLang="en-US" sz="2400" dirty="0">
+                <a:latin typeface="나눔고딕 ExtraBold" panose="020D0904000000000000" pitchFamily="50" charset="-127"/>
+                <a:ea typeface="나눔고딕 ExtraBold" panose="020D0904000000000000" pitchFamily="50" charset="-127"/>
+              </a:rPr>
+              <a:t>변수 이름 </a:t>
+            </a:r>
+            <a:r>
+              <a:rPr lang="en-US" altLang="ko-KR" sz="2400" dirty="0">
+                <a:latin typeface="나눔고딕 ExtraBold" panose="020D0904000000000000" pitchFamily="50" charset="-127"/>
+                <a:ea typeface="나눔고딕 ExtraBold" panose="020D0904000000000000" pitchFamily="50" charset="-127"/>
+              </a:rPr>
+              <a:t>: </a:t>
+            </a:r>
+            <a:r>
+              <a:rPr lang="ko-KR" altLang="en-US" sz="2400" dirty="0">
+                <a:latin typeface="나눔고딕 ExtraBold" panose="020D0904000000000000" pitchFamily="50" charset="-127"/>
+                <a:ea typeface="나눔고딕 ExtraBold" panose="020D0904000000000000" pitchFamily="50" charset="-127"/>
+              </a:rPr>
+              <a:t>변수 타입 </a:t>
+            </a:r>
+            <a:r>
+              <a:rPr lang="en-US" altLang="ko-KR" sz="2400" dirty="0">
+                <a:latin typeface="나눔고딕 ExtraBold" panose="020D0904000000000000" pitchFamily="50" charset="-127"/>
+                <a:ea typeface="나눔고딕 ExtraBold" panose="020D0904000000000000" pitchFamily="50" charset="-127"/>
+              </a:rPr>
+              <a:t>= </a:t>
+            </a:r>
+            <a:r>
+              <a:rPr lang="ko-KR" altLang="en-US" sz="2400" dirty="0">
+                <a:latin typeface="나눔고딕 ExtraBold" panose="020D0904000000000000" pitchFamily="50" charset="-127"/>
+                <a:ea typeface="나눔고딕 ExtraBold" panose="020D0904000000000000" pitchFamily="50" charset="-127"/>
+              </a:rPr>
+              <a:t>값</a:t>
+            </a:r>
+            <a:r>
+              <a:rPr lang="en-US" altLang="ko-KR" sz="2400" dirty="0">
+                <a:latin typeface="나눔고딕 ExtraBold" panose="020D0904000000000000" pitchFamily="50" charset="-127"/>
+                <a:ea typeface="나눔고딕 ExtraBold" panose="020D0904000000000000" pitchFamily="50" charset="-127"/>
+              </a:rPr>
+              <a:t>]</a:t>
+            </a:r>
+          </a:p>
+          <a:p>
+            <a:endParaRPr lang="ko-KR" altLang="en-US" sz="2400" dirty="0">
+              <a:latin typeface="나눔고딕 ExtraBold" panose="020D0904000000000000" pitchFamily="50" charset="-127"/>
+              <a:ea typeface="나눔고딕 ExtraBold" panose="020D0904000000000000" pitchFamily="50" charset="-127"/>
+            </a:endParaRPr>
           </a:p>
         </p:txBody>
       </p:sp>
@@ -10895,6 +11119,766 @@
 </file>
 
 <file path=ppt/slides/slide11.xml><?xml version="1.0" encoding="utf-8"?>
+<p:sld xmlns:a="http://schemas.openxmlformats.org/drawingml/2006/main" xmlns:r="http://schemas.openxmlformats.org/officeDocument/2006/relationships" xmlns:p="http://schemas.openxmlformats.org/presentationml/2006/main">
+  <p:cSld>
+    <p:spTree>
+      <p:nvGrpSpPr>
+        <p:cNvPr id="1" name=""/>
+        <p:cNvGrpSpPr/>
+        <p:nvPr/>
+      </p:nvGrpSpPr>
+      <p:grpSpPr>
+        <a:xfrm>
+          <a:off x="0" y="0"/>
+          <a:ext cx="0" cy="0"/>
+          <a:chOff x="0" y="0"/>
+          <a:chExt cx="0" cy="0"/>
+        </a:xfrm>
+      </p:grpSpPr>
+      <p:sp>
+        <p:nvSpPr>
+          <p:cNvPr id="2" name="TextBox 1">
+            <a:extLst>
+              <a:ext uri="{FF2B5EF4-FFF2-40B4-BE49-F238E27FC236}">
+                <a16:creationId xmlns:a16="http://schemas.microsoft.com/office/drawing/2014/main" id="{DB9E9384-3100-4726-95F8-C05728634F8A}"/>
+              </a:ext>
+            </a:extLst>
+          </p:cNvPr>
+          <p:cNvSpPr txBox="1"/>
+          <p:nvPr/>
+        </p:nvSpPr>
+        <p:spPr>
+          <a:xfrm>
+            <a:off x="780876" y="201119"/>
+            <a:ext cx="9758597" cy="6740307"/>
+          </a:xfrm>
+          <a:prstGeom prst="rect">
+            <a:avLst/>
+          </a:prstGeom>
+          <a:noFill/>
+        </p:spPr>
+        <p:txBody>
+          <a:bodyPr wrap="square" rtlCol="0">
+            <a:spAutoFit/>
+          </a:bodyPr>
+          <a:lstStyle/>
+          <a:p>
+            <a:r>
+              <a:rPr lang="ko-KR" altLang="en-US" sz="3200" dirty="0">
+                <a:latin typeface="나눔고딕 ExtraBold" panose="020D0904000000000000" pitchFamily="50" charset="-127"/>
+                <a:ea typeface="나눔고딕 ExtraBold" panose="020D0904000000000000" pitchFamily="50" charset="-127"/>
+              </a:rPr>
+              <a:t>변수 선언</a:t>
+            </a:r>
+            <a:endParaRPr lang="en-US" altLang="ko-KR" sz="3200" dirty="0">
+              <a:latin typeface="나눔고딕 ExtraBold" panose="020D0904000000000000" pitchFamily="50" charset="-127"/>
+              <a:ea typeface="나눔고딕 ExtraBold" panose="020D0904000000000000" pitchFamily="50" charset="-127"/>
+            </a:endParaRPr>
+          </a:p>
+          <a:p>
+            <a:endParaRPr lang="en-US" altLang="ko-KR" sz="2400" dirty="0">
+              <a:latin typeface="나눔고딕 ExtraBold" panose="020D0904000000000000" pitchFamily="50" charset="-127"/>
+              <a:ea typeface="나눔고딕 ExtraBold" panose="020D0904000000000000" pitchFamily="50" charset="-127"/>
+            </a:endParaRPr>
+          </a:p>
+          <a:p>
+            <a:r>
+              <a:rPr lang="en-US" altLang="ko-KR" sz="2400" dirty="0" err="1">
+                <a:latin typeface="나눔고딕 ExtraBold" panose="020D0904000000000000" pitchFamily="50" charset="-127"/>
+                <a:ea typeface="나눔고딕 ExtraBold" panose="020D0904000000000000" pitchFamily="50" charset="-127"/>
+              </a:rPr>
+              <a:t>val</a:t>
+            </a:r>
+            <a:r>
+              <a:rPr lang="en-US" altLang="ko-KR" sz="2400" dirty="0">
+                <a:latin typeface="나눔고딕 ExtraBold" panose="020D0904000000000000" pitchFamily="50" charset="-127"/>
+                <a:ea typeface="나눔고딕 ExtraBold" panose="020D0904000000000000" pitchFamily="50" charset="-127"/>
+              </a:rPr>
+              <a:t> name : String = “name”</a:t>
+            </a:r>
+          </a:p>
+          <a:p>
+            <a:r>
+              <a:rPr lang="en-US" altLang="ko-KR" sz="2400" dirty="0">
+                <a:latin typeface="나눔고딕 ExtraBold" panose="020D0904000000000000" pitchFamily="50" charset="-127"/>
+                <a:ea typeface="나눔고딕 ExtraBold" panose="020D0904000000000000" pitchFamily="50" charset="-127"/>
+              </a:rPr>
+              <a:t>var age : Int = 17</a:t>
+            </a:r>
+          </a:p>
+          <a:p>
+            <a:endParaRPr lang="en-US" altLang="ko-KR" sz="2400" dirty="0">
+              <a:latin typeface="나눔고딕 ExtraBold" panose="020D0904000000000000" pitchFamily="50" charset="-127"/>
+              <a:ea typeface="나눔고딕 ExtraBold" panose="020D0904000000000000" pitchFamily="50" charset="-127"/>
+            </a:endParaRPr>
+          </a:p>
+          <a:p>
+            <a:r>
+              <a:rPr lang="en-US" altLang="ko-KR" sz="2400" dirty="0">
+                <a:latin typeface="나눔고딕 ExtraBold" panose="020D0904000000000000" pitchFamily="50" charset="-127"/>
+                <a:ea typeface="나눔고딕 ExtraBold" panose="020D0904000000000000" pitchFamily="50" charset="-127"/>
+              </a:rPr>
+              <a:t>(Kotlin</a:t>
+            </a:r>
+            <a:r>
+              <a:rPr lang="ko-KR" altLang="en-US" sz="2400" dirty="0">
+                <a:latin typeface="나눔고딕 ExtraBold" panose="020D0904000000000000" pitchFamily="50" charset="-127"/>
+                <a:ea typeface="나눔고딕 ExtraBold" panose="020D0904000000000000" pitchFamily="50" charset="-127"/>
+              </a:rPr>
+              <a:t>은 </a:t>
+            </a:r>
+            <a:r>
+              <a:rPr lang="en-US" altLang="ko-KR" sz="2400" dirty="0">
+                <a:latin typeface="나눔고딕 ExtraBold" panose="020D0904000000000000" pitchFamily="50" charset="-127"/>
+                <a:ea typeface="나눔고딕 ExtraBold" panose="020D0904000000000000" pitchFamily="50" charset="-127"/>
+              </a:rPr>
+              <a:t>‘;’</a:t>
+            </a:r>
+            <a:r>
+              <a:rPr lang="ko-KR" altLang="en-US" sz="2400" dirty="0">
+                <a:latin typeface="나눔고딕 ExtraBold" panose="020D0904000000000000" pitchFamily="50" charset="-127"/>
+                <a:ea typeface="나눔고딕 ExtraBold" panose="020D0904000000000000" pitchFamily="50" charset="-127"/>
+              </a:rPr>
+              <a:t>을 쓰지 않아도 된다</a:t>
+            </a:r>
+            <a:r>
+              <a:rPr lang="en-US" altLang="ko-KR" sz="2400" dirty="0">
+                <a:latin typeface="나눔고딕 ExtraBold" panose="020D0904000000000000" pitchFamily="50" charset="-127"/>
+                <a:ea typeface="나눔고딕 ExtraBold" panose="020D0904000000000000" pitchFamily="50" charset="-127"/>
+              </a:rPr>
+              <a:t>)</a:t>
+            </a:r>
+          </a:p>
+          <a:p>
+            <a:r>
+              <a:rPr lang="en-US" altLang="ko-KR" sz="2400" dirty="0" err="1">
+                <a:latin typeface="나눔고딕 ExtraBold" panose="020D0904000000000000" pitchFamily="50" charset="-127"/>
+                <a:ea typeface="나눔고딕 ExtraBold" panose="020D0904000000000000" pitchFamily="50" charset="-127"/>
+              </a:rPr>
+              <a:t>by..lazy</a:t>
+            </a:r>
+            <a:r>
+              <a:rPr lang="ko-KR" altLang="en-US" sz="2400" dirty="0">
+                <a:latin typeface="나눔고딕 ExtraBold" panose="020D0904000000000000" pitchFamily="50" charset="-127"/>
+                <a:ea typeface="나눔고딕 ExtraBold" panose="020D0904000000000000" pitchFamily="50" charset="-127"/>
+              </a:rPr>
+              <a:t>나 </a:t>
+            </a:r>
+            <a:r>
+              <a:rPr lang="en-US" altLang="ko-KR" sz="2400" dirty="0" err="1">
+                <a:latin typeface="나눔고딕 ExtraBold" panose="020D0904000000000000" pitchFamily="50" charset="-127"/>
+                <a:ea typeface="나눔고딕 ExtraBold" panose="020D0904000000000000" pitchFamily="50" charset="-127"/>
+              </a:rPr>
+              <a:t>lateinit</a:t>
+            </a:r>
+            <a:r>
+              <a:rPr lang="ko-KR" altLang="en-US" sz="2400" dirty="0">
+                <a:latin typeface="나눔고딕 ExtraBold" panose="020D0904000000000000" pitchFamily="50" charset="-127"/>
+                <a:ea typeface="나눔고딕 ExtraBold" panose="020D0904000000000000" pitchFamily="50" charset="-127"/>
+              </a:rPr>
+              <a:t>등의 키워드가 있지만 각자 알아보자</a:t>
+            </a:r>
+            <a:endParaRPr lang="en-US" altLang="ko-KR" sz="2400" dirty="0">
+              <a:latin typeface="나눔고딕 ExtraBold" panose="020D0904000000000000" pitchFamily="50" charset="-127"/>
+              <a:ea typeface="나눔고딕 ExtraBold" panose="020D0904000000000000" pitchFamily="50" charset="-127"/>
+            </a:endParaRPr>
+          </a:p>
+          <a:p>
+            <a:endParaRPr lang="en-US" altLang="ko-KR" sz="2400" dirty="0">
+              <a:latin typeface="나눔고딕 ExtraBold" panose="020D0904000000000000" pitchFamily="50" charset="-127"/>
+              <a:ea typeface="나눔고딕 ExtraBold" panose="020D0904000000000000" pitchFamily="50" charset="-127"/>
+            </a:endParaRPr>
+          </a:p>
+          <a:p>
+            <a:r>
+              <a:rPr lang="ko-KR" altLang="en-US" sz="3200" dirty="0">
+                <a:latin typeface="나눔고딕 ExtraBold" panose="020D0904000000000000" pitchFamily="50" charset="-127"/>
+                <a:ea typeface="나눔고딕 ExtraBold" panose="020D0904000000000000" pitchFamily="50" charset="-127"/>
+              </a:rPr>
+              <a:t>간편함</a:t>
+            </a:r>
+            <a:endParaRPr lang="en-US" altLang="ko-KR" sz="3200" dirty="0">
+              <a:latin typeface="나눔고딕 ExtraBold" panose="020D0904000000000000" pitchFamily="50" charset="-127"/>
+              <a:ea typeface="나눔고딕 ExtraBold" panose="020D0904000000000000" pitchFamily="50" charset="-127"/>
+            </a:endParaRPr>
+          </a:p>
+          <a:p>
+            <a:endParaRPr lang="en-US" altLang="ko-KR" sz="3200" dirty="0">
+              <a:latin typeface="나눔고딕 ExtraBold" panose="020D0904000000000000" pitchFamily="50" charset="-127"/>
+              <a:ea typeface="나눔고딕 ExtraBold" panose="020D0904000000000000" pitchFamily="50" charset="-127"/>
+            </a:endParaRPr>
+          </a:p>
+          <a:p>
+            <a:r>
+              <a:rPr lang="en-US" altLang="ko-KR" sz="2400" dirty="0">
+                <a:latin typeface="나눔고딕 ExtraBold" panose="020D0904000000000000" pitchFamily="50" charset="-127"/>
+                <a:ea typeface="나눔고딕 ExtraBold" panose="020D0904000000000000" pitchFamily="50" charset="-127"/>
+              </a:rPr>
+              <a:t>Java</a:t>
+            </a:r>
+            <a:r>
+              <a:rPr lang="ko-KR" altLang="en-US" sz="2400" dirty="0">
+                <a:latin typeface="나눔고딕 ExtraBold" panose="020D0904000000000000" pitchFamily="50" charset="-127"/>
+                <a:ea typeface="나눔고딕 ExtraBold" panose="020D0904000000000000" pitchFamily="50" charset="-127"/>
+              </a:rPr>
+              <a:t>의 경우에 </a:t>
+            </a:r>
+            <a:r>
+              <a:rPr lang="en-US" altLang="ko-KR" sz="2400" dirty="0" err="1">
+                <a:latin typeface="나눔고딕 ExtraBold" panose="020D0904000000000000" pitchFamily="50" charset="-127"/>
+                <a:ea typeface="나눔고딕 ExtraBold" panose="020D0904000000000000" pitchFamily="50" charset="-127"/>
+              </a:rPr>
+              <a:t>System.out.println</a:t>
+            </a:r>
+            <a:r>
+              <a:rPr lang="en-US" altLang="ko-KR" sz="2400" dirty="0">
+                <a:latin typeface="나눔고딕 ExtraBold" panose="020D0904000000000000" pitchFamily="50" charset="-127"/>
+                <a:ea typeface="나눔고딕 ExtraBold" panose="020D0904000000000000" pitchFamily="50" charset="-127"/>
+              </a:rPr>
+              <a:t>(); </a:t>
+            </a:r>
+            <a:r>
+              <a:rPr lang="ko-KR" altLang="en-US" sz="2400" dirty="0">
+                <a:latin typeface="나눔고딕 ExtraBold" panose="020D0904000000000000" pitchFamily="50" charset="-127"/>
+                <a:ea typeface="나눔고딕 ExtraBold" panose="020D0904000000000000" pitchFamily="50" charset="-127"/>
+              </a:rPr>
+              <a:t>과 같이 </a:t>
+            </a:r>
+            <a:r>
+              <a:rPr lang="ko-KR" altLang="en-US" sz="2400" dirty="0" err="1">
+                <a:latin typeface="나눔고딕 ExtraBold" panose="020D0904000000000000" pitchFamily="50" charset="-127"/>
+                <a:ea typeface="나눔고딕 ExtraBold" panose="020D0904000000000000" pitchFamily="50" charset="-127"/>
+              </a:rPr>
+              <a:t>써야하지만</a:t>
+            </a:r>
+            <a:endParaRPr lang="en-US" altLang="ko-KR" sz="2400" dirty="0">
+              <a:latin typeface="나눔고딕 ExtraBold" panose="020D0904000000000000" pitchFamily="50" charset="-127"/>
+              <a:ea typeface="나눔고딕 ExtraBold" panose="020D0904000000000000" pitchFamily="50" charset="-127"/>
+            </a:endParaRPr>
+          </a:p>
+          <a:p>
+            <a:endParaRPr lang="en-US" altLang="ko-KR" sz="2400" dirty="0">
+              <a:latin typeface="나눔고딕 ExtraBold" panose="020D0904000000000000" pitchFamily="50" charset="-127"/>
+              <a:ea typeface="나눔고딕 ExtraBold" panose="020D0904000000000000" pitchFamily="50" charset="-127"/>
+            </a:endParaRPr>
+          </a:p>
+          <a:p>
+            <a:r>
+              <a:rPr lang="en-US" altLang="ko-KR" sz="2400" dirty="0">
+                <a:latin typeface="나눔고딕 ExtraBold" panose="020D0904000000000000" pitchFamily="50" charset="-127"/>
+                <a:ea typeface="나눔고딕 ExtraBold" panose="020D0904000000000000" pitchFamily="50" charset="-127"/>
+              </a:rPr>
+              <a:t>Kotlin</a:t>
+            </a:r>
+            <a:r>
+              <a:rPr lang="ko-KR" altLang="en-US" sz="2400" dirty="0">
+                <a:latin typeface="나눔고딕 ExtraBold" panose="020D0904000000000000" pitchFamily="50" charset="-127"/>
+                <a:ea typeface="나눔고딕 ExtraBold" panose="020D0904000000000000" pitchFamily="50" charset="-127"/>
+              </a:rPr>
+              <a:t>은 </a:t>
+            </a:r>
+            <a:r>
+              <a:rPr lang="en-US" altLang="ko-KR" sz="2400" dirty="0" err="1">
+                <a:latin typeface="나눔고딕 ExtraBold" panose="020D0904000000000000" pitchFamily="50" charset="-127"/>
+                <a:ea typeface="나눔고딕 ExtraBold" panose="020D0904000000000000" pitchFamily="50" charset="-127"/>
+              </a:rPr>
+              <a:t>println</a:t>
+            </a:r>
+            <a:r>
+              <a:rPr lang="en-US" altLang="ko-KR" sz="2400" dirty="0">
+                <a:latin typeface="나눔고딕 ExtraBold" panose="020D0904000000000000" pitchFamily="50" charset="-127"/>
+                <a:ea typeface="나눔고딕 ExtraBold" panose="020D0904000000000000" pitchFamily="50" charset="-127"/>
+              </a:rPr>
+              <a:t>() </a:t>
+            </a:r>
+            <a:r>
+              <a:rPr lang="ko-KR" altLang="en-US" sz="2400" dirty="0">
+                <a:latin typeface="나눔고딕 ExtraBold" panose="020D0904000000000000" pitchFamily="50" charset="-127"/>
+                <a:ea typeface="나눔고딕 ExtraBold" panose="020D0904000000000000" pitchFamily="50" charset="-127"/>
+              </a:rPr>
+              <a:t>으로 똑같은 기능을 사용할 수 있다</a:t>
+            </a:r>
+            <a:r>
+              <a:rPr lang="en-US" altLang="ko-KR" sz="2400" dirty="0">
+                <a:latin typeface="나눔고딕 ExtraBold" panose="020D0904000000000000" pitchFamily="50" charset="-127"/>
+                <a:ea typeface="나눔고딕 ExtraBold" panose="020D0904000000000000" pitchFamily="50" charset="-127"/>
+              </a:rPr>
+              <a:t>.</a:t>
+            </a:r>
+          </a:p>
+          <a:p>
+            <a:endParaRPr lang="en-US" altLang="ko-KR" sz="2400" dirty="0">
+              <a:latin typeface="나눔고딕 ExtraBold" panose="020D0904000000000000" pitchFamily="50" charset="-127"/>
+              <a:ea typeface="나눔고딕 ExtraBold" panose="020D0904000000000000" pitchFamily="50" charset="-127"/>
+            </a:endParaRPr>
+          </a:p>
+          <a:p>
+            <a:r>
+              <a:rPr lang="ko-KR" altLang="en-US" sz="2400" dirty="0">
+                <a:latin typeface="나눔고딕 ExtraBold" panose="020D0904000000000000" pitchFamily="50" charset="-127"/>
+                <a:ea typeface="나눔고딕 ExtraBold" panose="020D0904000000000000" pitchFamily="50" charset="-127"/>
+              </a:rPr>
+              <a:t>이것처럼 여러모로 자바보다 코드 작성이 </a:t>
+            </a:r>
+            <a:r>
+              <a:rPr lang="ko-KR" altLang="en-US" sz="2400" dirty="0" err="1">
+                <a:latin typeface="나눔고딕 ExtraBold" panose="020D0904000000000000" pitchFamily="50" charset="-127"/>
+                <a:ea typeface="나눔고딕 ExtraBold" panose="020D0904000000000000" pitchFamily="50" charset="-127"/>
+              </a:rPr>
+              <a:t>간편해진다</a:t>
+            </a:r>
+            <a:r>
+              <a:rPr lang="en-US" altLang="ko-KR" sz="2400" dirty="0">
+                <a:latin typeface="나눔고딕 ExtraBold" panose="020D0904000000000000" pitchFamily="50" charset="-127"/>
+                <a:ea typeface="나눔고딕 ExtraBold" panose="020D0904000000000000" pitchFamily="50" charset="-127"/>
+              </a:rPr>
+              <a:t>.</a:t>
+            </a:r>
+          </a:p>
+          <a:p>
+            <a:endParaRPr lang="en-US" altLang="ko-KR" sz="2400" dirty="0">
+              <a:latin typeface="나눔고딕 ExtraBold" panose="020D0904000000000000" pitchFamily="50" charset="-127"/>
+              <a:ea typeface="나눔고딕 ExtraBold" panose="020D0904000000000000" pitchFamily="50" charset="-127"/>
+            </a:endParaRPr>
+          </a:p>
+          <a:p>
+            <a:endParaRPr lang="en-US" altLang="ko-KR" sz="2400" dirty="0">
+              <a:latin typeface="나눔고딕 ExtraBold" panose="020D0904000000000000" pitchFamily="50" charset="-127"/>
+              <a:ea typeface="나눔고딕 ExtraBold" panose="020D0904000000000000" pitchFamily="50" charset="-127"/>
+            </a:endParaRPr>
+          </a:p>
+        </p:txBody>
+      </p:sp>
+    </p:spTree>
+    <p:extLst>
+      <p:ext uri="{BB962C8B-B14F-4D97-AF65-F5344CB8AC3E}">
+        <p14:creationId xmlns:p14="http://schemas.microsoft.com/office/powerpoint/2010/main" val="3069396666"/>
+      </p:ext>
+    </p:extLst>
+  </p:cSld>
+  <p:clrMapOvr>
+    <a:masterClrMapping/>
+  </p:clrMapOvr>
+</p:sld>
+</file>
+
+<file path=ppt/slides/slide12.xml><?xml version="1.0" encoding="utf-8"?>
+<p:sld xmlns:a="http://schemas.openxmlformats.org/drawingml/2006/main" xmlns:r="http://schemas.openxmlformats.org/officeDocument/2006/relationships" xmlns:p="http://schemas.openxmlformats.org/presentationml/2006/main">
+  <p:cSld>
+    <p:spTree>
+      <p:nvGrpSpPr>
+        <p:cNvPr id="1" name=""/>
+        <p:cNvGrpSpPr/>
+        <p:nvPr/>
+      </p:nvGrpSpPr>
+      <p:grpSpPr>
+        <a:xfrm>
+          <a:off x="0" y="0"/>
+          <a:ext cx="0" cy="0"/>
+          <a:chOff x="0" y="0"/>
+          <a:chExt cx="0" cy="0"/>
+        </a:xfrm>
+      </p:grpSpPr>
+      <p:sp>
+        <p:nvSpPr>
+          <p:cNvPr id="2" name="TextBox 1">
+            <a:extLst>
+              <a:ext uri="{FF2B5EF4-FFF2-40B4-BE49-F238E27FC236}">
+                <a16:creationId xmlns:a16="http://schemas.microsoft.com/office/drawing/2014/main" id="{DB9E9384-3100-4726-95F8-C05728634F8A}"/>
+              </a:ext>
+            </a:extLst>
+          </p:cNvPr>
+          <p:cNvSpPr txBox="1"/>
+          <p:nvPr/>
+        </p:nvSpPr>
+        <p:spPr>
+          <a:xfrm>
+            <a:off x="763943" y="472052"/>
+            <a:ext cx="9758597" cy="6494085"/>
+          </a:xfrm>
+          <a:prstGeom prst="rect">
+            <a:avLst/>
+          </a:prstGeom>
+          <a:noFill/>
+        </p:spPr>
+        <p:txBody>
+          <a:bodyPr wrap="square" rtlCol="0">
+            <a:spAutoFit/>
+          </a:bodyPr>
+          <a:lstStyle/>
+          <a:p>
+            <a:r>
+              <a:rPr lang="ko-KR" altLang="en-US" sz="3200" dirty="0">
+                <a:latin typeface="나눔고딕 ExtraBold" panose="020D0904000000000000" pitchFamily="50" charset="-127"/>
+                <a:ea typeface="나눔고딕 ExtraBold" panose="020D0904000000000000" pitchFamily="50" charset="-127"/>
+              </a:rPr>
+              <a:t>함수 선언</a:t>
+            </a:r>
+            <a:endParaRPr lang="en-US" altLang="ko-KR" sz="3200" dirty="0">
+              <a:latin typeface="나눔고딕 ExtraBold" panose="020D0904000000000000" pitchFamily="50" charset="-127"/>
+              <a:ea typeface="나눔고딕 ExtraBold" panose="020D0904000000000000" pitchFamily="50" charset="-127"/>
+            </a:endParaRPr>
+          </a:p>
+          <a:p>
+            <a:endParaRPr lang="en-US" altLang="ko-KR" sz="2400" dirty="0">
+              <a:latin typeface="나눔고딕 ExtraBold" panose="020D0904000000000000" pitchFamily="50" charset="-127"/>
+              <a:ea typeface="나눔고딕 ExtraBold" panose="020D0904000000000000" pitchFamily="50" charset="-127"/>
+            </a:endParaRPr>
+          </a:p>
+          <a:p>
+            <a:r>
+              <a:rPr lang="ko-KR" altLang="en-US" sz="2400" dirty="0">
+                <a:latin typeface="나눔고딕 ExtraBold" panose="020D0904000000000000" pitchFamily="50" charset="-127"/>
+                <a:ea typeface="나눔고딕 ExtraBold" panose="020D0904000000000000" pitchFamily="50" charset="-127"/>
+              </a:rPr>
+              <a:t>함수는 </a:t>
+            </a:r>
+            <a:r>
+              <a:rPr lang="en-US" altLang="ko-KR" sz="2400" dirty="0">
+                <a:latin typeface="나눔고딕 ExtraBold" panose="020D0904000000000000" pitchFamily="50" charset="-127"/>
+                <a:ea typeface="나눔고딕 ExtraBold" panose="020D0904000000000000" pitchFamily="50" charset="-127"/>
+              </a:rPr>
+              <a:t>fun</a:t>
+            </a:r>
+            <a:r>
+              <a:rPr lang="ko-KR" altLang="en-US" sz="2400" dirty="0">
+                <a:latin typeface="나눔고딕 ExtraBold" panose="020D0904000000000000" pitchFamily="50" charset="-127"/>
+                <a:ea typeface="나눔고딕 ExtraBold" panose="020D0904000000000000" pitchFamily="50" charset="-127"/>
+              </a:rPr>
+              <a:t>이라는 키워드로 선언한다</a:t>
+            </a:r>
+            <a:r>
+              <a:rPr lang="en-US" altLang="ko-KR" sz="2400" dirty="0">
+                <a:latin typeface="나눔고딕 ExtraBold" panose="020D0904000000000000" pitchFamily="50" charset="-127"/>
+                <a:ea typeface="나눔고딕 ExtraBold" panose="020D0904000000000000" pitchFamily="50" charset="-127"/>
+              </a:rPr>
+              <a:t>.</a:t>
+            </a:r>
+          </a:p>
+          <a:p>
+            <a:r>
+              <a:rPr lang="en-US" altLang="ko-KR" sz="2400" dirty="0">
+                <a:latin typeface="나눔고딕 ExtraBold" panose="020D0904000000000000" pitchFamily="50" charset="-127"/>
+                <a:ea typeface="나눔고딕 ExtraBold" panose="020D0904000000000000" pitchFamily="50" charset="-127"/>
+              </a:rPr>
+              <a:t>Java</a:t>
+            </a:r>
+            <a:r>
+              <a:rPr lang="ko-KR" altLang="en-US" sz="2400" dirty="0">
+                <a:latin typeface="나눔고딕 ExtraBold" panose="020D0904000000000000" pitchFamily="50" charset="-127"/>
+                <a:ea typeface="나눔고딕 ExtraBold" panose="020D0904000000000000" pitchFamily="50" charset="-127"/>
+              </a:rPr>
+              <a:t>와 같이 </a:t>
+            </a:r>
+            <a:r>
+              <a:rPr lang="en-US" altLang="ko-KR" sz="2400" dirty="0">
+                <a:latin typeface="나눔고딕 ExtraBold" panose="020D0904000000000000" pitchFamily="50" charset="-127"/>
+                <a:ea typeface="나눔고딕 ExtraBold" panose="020D0904000000000000" pitchFamily="50" charset="-127"/>
+              </a:rPr>
+              <a:t>private, public</a:t>
+            </a:r>
+            <a:r>
+              <a:rPr lang="ko-KR" altLang="en-US" sz="2400" dirty="0">
+                <a:latin typeface="나눔고딕 ExtraBold" panose="020D0904000000000000" pitchFamily="50" charset="-127"/>
+                <a:ea typeface="나눔고딕 ExtraBold" panose="020D0904000000000000" pitchFamily="50" charset="-127"/>
+              </a:rPr>
+              <a:t>은 앞에 붙여 쓸 수 있다</a:t>
+            </a:r>
+            <a:r>
+              <a:rPr lang="en-US" altLang="ko-KR" sz="2400" dirty="0">
+                <a:latin typeface="나눔고딕 ExtraBold" panose="020D0904000000000000" pitchFamily="50" charset="-127"/>
+                <a:ea typeface="나눔고딕 ExtraBold" panose="020D0904000000000000" pitchFamily="50" charset="-127"/>
+              </a:rPr>
+              <a:t>.</a:t>
+            </a:r>
+          </a:p>
+          <a:p>
+            <a:endParaRPr lang="en-US" altLang="ko-KR" sz="2400" dirty="0">
+              <a:latin typeface="나눔고딕 ExtraBold" panose="020D0904000000000000" pitchFamily="50" charset="-127"/>
+              <a:ea typeface="나눔고딕 ExtraBold" panose="020D0904000000000000" pitchFamily="50" charset="-127"/>
+            </a:endParaRPr>
+          </a:p>
+          <a:p>
+            <a:r>
+              <a:rPr lang="en-US" altLang="ko-KR" sz="2400" dirty="0">
+                <a:latin typeface="나눔고딕 ExtraBold" panose="020D0904000000000000" pitchFamily="50" charset="-127"/>
+                <a:ea typeface="나눔고딕 ExtraBold" panose="020D0904000000000000" pitchFamily="50" charset="-127"/>
+              </a:rPr>
+              <a:t>[fun </a:t>
+            </a:r>
+            <a:r>
+              <a:rPr lang="ko-KR" altLang="en-US" sz="2400" dirty="0">
+                <a:latin typeface="나눔고딕 ExtraBold" panose="020D0904000000000000" pitchFamily="50" charset="-127"/>
+                <a:ea typeface="나눔고딕 ExtraBold" panose="020D0904000000000000" pitchFamily="50" charset="-127"/>
+              </a:rPr>
+              <a:t>함수 이름 </a:t>
+            </a:r>
+            <a:r>
+              <a:rPr lang="en-US" altLang="ko-KR" sz="2400" dirty="0">
+                <a:latin typeface="나눔고딕 ExtraBold" panose="020D0904000000000000" pitchFamily="50" charset="-127"/>
+                <a:ea typeface="나눔고딕 ExtraBold" panose="020D0904000000000000" pitchFamily="50" charset="-127"/>
+              </a:rPr>
+              <a:t>: </a:t>
+            </a:r>
+            <a:r>
+              <a:rPr lang="ko-KR" altLang="en-US" sz="2400" dirty="0">
+                <a:latin typeface="나눔고딕 ExtraBold" panose="020D0904000000000000" pitchFamily="50" charset="-127"/>
+                <a:ea typeface="나눔고딕 ExtraBold" panose="020D0904000000000000" pitchFamily="50" charset="-127"/>
+              </a:rPr>
+              <a:t>반환 타입</a:t>
+            </a:r>
+            <a:r>
+              <a:rPr lang="en-US" altLang="ko-KR" sz="2400" dirty="0">
+                <a:latin typeface="나눔고딕 ExtraBold" panose="020D0904000000000000" pitchFamily="50" charset="-127"/>
+                <a:ea typeface="나눔고딕 ExtraBold" panose="020D0904000000000000" pitchFamily="50" charset="-127"/>
+              </a:rPr>
+              <a:t>(</a:t>
+            </a:r>
+            <a:r>
+              <a:rPr lang="ko-KR" altLang="en-US" sz="2400" dirty="0">
+                <a:latin typeface="나눔고딕 ExtraBold" panose="020D0904000000000000" pitchFamily="50" charset="-127"/>
+                <a:ea typeface="나눔고딕 ExtraBold" panose="020D0904000000000000" pitchFamily="50" charset="-127"/>
+              </a:rPr>
+              <a:t>파라미터</a:t>
+            </a:r>
+            <a:r>
+              <a:rPr lang="en-US" altLang="ko-KR" sz="2400" dirty="0">
+                <a:latin typeface="나눔고딕 ExtraBold" panose="020D0904000000000000" pitchFamily="50" charset="-127"/>
+                <a:ea typeface="나눔고딕 ExtraBold" panose="020D0904000000000000" pitchFamily="50" charset="-127"/>
+              </a:rPr>
+              <a:t>)</a:t>
+            </a:r>
+            <a:r>
+              <a:rPr lang="ko-KR" altLang="en-US" sz="2400" dirty="0">
+                <a:latin typeface="나눔고딕 ExtraBold" panose="020D0904000000000000" pitchFamily="50" charset="-127"/>
+                <a:ea typeface="나눔고딕 ExtraBold" panose="020D0904000000000000" pitchFamily="50" charset="-127"/>
+              </a:rPr>
+              <a:t> </a:t>
+            </a:r>
+            <a:r>
+              <a:rPr lang="en-US" altLang="ko-KR" sz="2400" dirty="0">
+                <a:latin typeface="나눔고딕 ExtraBold" panose="020D0904000000000000" pitchFamily="50" charset="-127"/>
+                <a:ea typeface="나눔고딕 ExtraBold" panose="020D0904000000000000" pitchFamily="50" charset="-127"/>
+              </a:rPr>
+              <a:t>{</a:t>
+            </a:r>
+            <a:r>
+              <a:rPr lang="ko-KR" altLang="en-US" sz="2400" dirty="0">
+                <a:latin typeface="나눔고딕 ExtraBold" panose="020D0904000000000000" pitchFamily="50" charset="-127"/>
+                <a:ea typeface="나눔고딕 ExtraBold" panose="020D0904000000000000" pitchFamily="50" charset="-127"/>
+              </a:rPr>
+              <a:t>내부 코드</a:t>
+            </a:r>
+            <a:r>
+              <a:rPr lang="en-US" altLang="ko-KR" sz="2400" dirty="0">
+                <a:latin typeface="나눔고딕 ExtraBold" panose="020D0904000000000000" pitchFamily="50" charset="-127"/>
+                <a:ea typeface="나눔고딕 ExtraBold" panose="020D0904000000000000" pitchFamily="50" charset="-127"/>
+              </a:rPr>
+              <a:t>}]</a:t>
+            </a:r>
+          </a:p>
+          <a:p>
+            <a:r>
+              <a:rPr lang="en-US" altLang="ko-KR" sz="2400" dirty="0">
+                <a:latin typeface="나눔고딕 ExtraBold" panose="020D0904000000000000" pitchFamily="50" charset="-127"/>
+                <a:ea typeface="나눔고딕 ExtraBold" panose="020D0904000000000000" pitchFamily="50" charset="-127"/>
+              </a:rPr>
+              <a:t>[fun </a:t>
+            </a:r>
+            <a:r>
+              <a:rPr lang="ko-KR" altLang="en-US" sz="2400" dirty="0">
+                <a:latin typeface="나눔고딕 ExtraBold" panose="020D0904000000000000" pitchFamily="50" charset="-127"/>
+                <a:ea typeface="나눔고딕 ExtraBold" panose="020D0904000000000000" pitchFamily="50" charset="-127"/>
+              </a:rPr>
+              <a:t>함수 이름 </a:t>
+            </a:r>
+            <a:r>
+              <a:rPr lang="en-US" altLang="ko-KR" sz="2400" dirty="0">
+                <a:latin typeface="나눔고딕 ExtraBold" panose="020D0904000000000000" pitchFamily="50" charset="-127"/>
+                <a:ea typeface="나눔고딕 ExtraBold" panose="020D0904000000000000" pitchFamily="50" charset="-127"/>
+              </a:rPr>
+              <a:t>: </a:t>
+            </a:r>
+            <a:r>
+              <a:rPr lang="ko-KR" altLang="en-US" sz="2400" dirty="0">
+                <a:latin typeface="나눔고딕 ExtraBold" panose="020D0904000000000000" pitchFamily="50" charset="-127"/>
+                <a:ea typeface="나눔고딕 ExtraBold" panose="020D0904000000000000" pitchFamily="50" charset="-127"/>
+              </a:rPr>
+              <a:t>반환 타입</a:t>
+            </a:r>
+            <a:r>
+              <a:rPr lang="en-US" altLang="ko-KR" sz="2400" dirty="0">
+                <a:latin typeface="나눔고딕 ExtraBold" panose="020D0904000000000000" pitchFamily="50" charset="-127"/>
+                <a:ea typeface="나눔고딕 ExtraBold" panose="020D0904000000000000" pitchFamily="50" charset="-127"/>
+              </a:rPr>
+              <a:t>(</a:t>
+            </a:r>
+            <a:r>
+              <a:rPr lang="ko-KR" altLang="en-US" sz="2400" dirty="0">
+                <a:latin typeface="나눔고딕 ExtraBold" panose="020D0904000000000000" pitchFamily="50" charset="-127"/>
+                <a:ea typeface="나눔고딕 ExtraBold" panose="020D0904000000000000" pitchFamily="50" charset="-127"/>
+              </a:rPr>
+              <a:t>파라미터</a:t>
+            </a:r>
+            <a:r>
+              <a:rPr lang="en-US" altLang="ko-KR" sz="2400" dirty="0">
+                <a:latin typeface="나눔고딕 ExtraBold" panose="020D0904000000000000" pitchFamily="50" charset="-127"/>
+                <a:ea typeface="나눔고딕 ExtraBold" panose="020D0904000000000000" pitchFamily="50" charset="-127"/>
+              </a:rPr>
+              <a:t>)</a:t>
+            </a:r>
+            <a:r>
+              <a:rPr lang="ko-KR" altLang="en-US" sz="2400" dirty="0">
+                <a:latin typeface="나눔고딕 ExtraBold" panose="020D0904000000000000" pitchFamily="50" charset="-127"/>
+                <a:ea typeface="나눔고딕 ExtraBold" panose="020D0904000000000000" pitchFamily="50" charset="-127"/>
+              </a:rPr>
+              <a:t> </a:t>
+            </a:r>
+            <a:r>
+              <a:rPr lang="en-US" altLang="ko-KR" sz="2400" dirty="0">
+                <a:latin typeface="나눔고딕 ExtraBold" panose="020D0904000000000000" pitchFamily="50" charset="-127"/>
+                <a:ea typeface="나눔고딕 ExtraBold" panose="020D0904000000000000" pitchFamily="50" charset="-127"/>
+              </a:rPr>
+              <a:t>= </a:t>
+            </a:r>
+            <a:r>
+              <a:rPr lang="ko-KR" altLang="en-US" sz="2400" dirty="0" err="1">
+                <a:latin typeface="나눔고딕 ExtraBold" panose="020D0904000000000000" pitchFamily="50" charset="-127"/>
+                <a:ea typeface="나눔고딕 ExtraBold" panose="020D0904000000000000" pitchFamily="50" charset="-127"/>
+              </a:rPr>
+              <a:t>반환값</a:t>
+            </a:r>
+            <a:r>
+              <a:rPr lang="en-US" altLang="ko-KR" sz="2400" dirty="0">
+                <a:latin typeface="나눔고딕 ExtraBold" panose="020D0904000000000000" pitchFamily="50" charset="-127"/>
+                <a:ea typeface="나눔고딕 ExtraBold" panose="020D0904000000000000" pitchFamily="50" charset="-127"/>
+              </a:rPr>
+              <a:t>]</a:t>
+            </a:r>
+          </a:p>
+          <a:p>
+            <a:endParaRPr lang="en-US" altLang="ko-KR" sz="2400" dirty="0">
+              <a:latin typeface="나눔고딕 ExtraBold" panose="020D0904000000000000" pitchFamily="50" charset="-127"/>
+              <a:ea typeface="나눔고딕 ExtraBold" panose="020D0904000000000000" pitchFamily="50" charset="-127"/>
+            </a:endParaRPr>
+          </a:p>
+          <a:p>
+            <a:r>
+              <a:rPr lang="en-US" altLang="ko-KR" sz="2400" dirty="0">
+                <a:latin typeface="나눔고딕 ExtraBold" panose="020D0904000000000000" pitchFamily="50" charset="-127"/>
+                <a:ea typeface="나눔고딕 ExtraBold" panose="020D0904000000000000" pitchFamily="50" charset="-127"/>
+              </a:rPr>
+              <a:t>public fun </a:t>
+            </a:r>
+            <a:r>
+              <a:rPr lang="en-US" altLang="ko-KR" sz="2400" dirty="0" err="1">
+                <a:latin typeface="나눔고딕 ExtraBold" panose="020D0904000000000000" pitchFamily="50" charset="-127"/>
+                <a:ea typeface="나눔고딕 ExtraBold" panose="020D0904000000000000" pitchFamily="50" charset="-127"/>
+              </a:rPr>
+              <a:t>getName</a:t>
+            </a:r>
+            <a:r>
+              <a:rPr lang="en-US" altLang="ko-KR" sz="2400" dirty="0">
+                <a:latin typeface="나눔고딕 ExtraBold" panose="020D0904000000000000" pitchFamily="50" charset="-127"/>
+                <a:ea typeface="나눔고딕 ExtraBold" panose="020D0904000000000000" pitchFamily="50" charset="-127"/>
+              </a:rPr>
+              <a:t>(name : String):String {</a:t>
+            </a:r>
+          </a:p>
+          <a:p>
+            <a:r>
+              <a:rPr lang="en-US" altLang="ko-KR" sz="2400" dirty="0">
+                <a:latin typeface="나눔고딕 ExtraBold" panose="020D0904000000000000" pitchFamily="50" charset="-127"/>
+                <a:ea typeface="나눔고딕 ExtraBold" panose="020D0904000000000000" pitchFamily="50" charset="-127"/>
+              </a:rPr>
+              <a:t>	return name</a:t>
+            </a:r>
+          </a:p>
+          <a:p>
+            <a:r>
+              <a:rPr lang="en-US" altLang="ko-KR" sz="2400" dirty="0">
+                <a:latin typeface="나눔고딕 ExtraBold" panose="020D0904000000000000" pitchFamily="50" charset="-127"/>
+                <a:ea typeface="나눔고딕 ExtraBold" panose="020D0904000000000000" pitchFamily="50" charset="-127"/>
+              </a:rPr>
+              <a:t>}</a:t>
+            </a:r>
+          </a:p>
+          <a:p>
+            <a:endParaRPr lang="en-US" altLang="ko-KR" sz="2400" dirty="0">
+              <a:latin typeface="나눔고딕 ExtraBold" panose="020D0904000000000000" pitchFamily="50" charset="-127"/>
+              <a:ea typeface="나눔고딕 ExtraBold" panose="020D0904000000000000" pitchFamily="50" charset="-127"/>
+            </a:endParaRPr>
+          </a:p>
+          <a:p>
+            <a:r>
+              <a:rPr lang="ko-KR" altLang="en-US" sz="2400" dirty="0">
+                <a:latin typeface="나눔고딕 ExtraBold" panose="020D0904000000000000" pitchFamily="50" charset="-127"/>
+                <a:ea typeface="나눔고딕 ExtraBold" panose="020D0904000000000000" pitchFamily="50" charset="-127"/>
+              </a:rPr>
+              <a:t>또는</a:t>
+            </a:r>
+            <a:endParaRPr lang="en-US" altLang="ko-KR" sz="2400" dirty="0">
+              <a:latin typeface="나눔고딕 ExtraBold" panose="020D0904000000000000" pitchFamily="50" charset="-127"/>
+              <a:ea typeface="나눔고딕 ExtraBold" panose="020D0904000000000000" pitchFamily="50" charset="-127"/>
+            </a:endParaRPr>
+          </a:p>
+          <a:p>
+            <a:endParaRPr lang="en-US" altLang="ko-KR" sz="2400" dirty="0">
+              <a:latin typeface="나눔고딕 ExtraBold" panose="020D0904000000000000" pitchFamily="50" charset="-127"/>
+              <a:ea typeface="나눔고딕 ExtraBold" panose="020D0904000000000000" pitchFamily="50" charset="-127"/>
+            </a:endParaRPr>
+          </a:p>
+          <a:p>
+            <a:r>
+              <a:rPr lang="en-US" altLang="ko-KR" sz="2400" dirty="0">
+                <a:latin typeface="나눔고딕 ExtraBold" panose="020D0904000000000000" pitchFamily="50" charset="-127"/>
+                <a:ea typeface="나눔고딕 ExtraBold" panose="020D0904000000000000" pitchFamily="50" charset="-127"/>
+              </a:rPr>
+              <a:t>public fun </a:t>
+            </a:r>
+            <a:r>
+              <a:rPr lang="en-US" altLang="ko-KR" sz="2400" dirty="0" err="1">
+                <a:latin typeface="나눔고딕 ExtraBold" panose="020D0904000000000000" pitchFamily="50" charset="-127"/>
+                <a:ea typeface="나눔고딕 ExtraBold" panose="020D0904000000000000" pitchFamily="50" charset="-127"/>
+              </a:rPr>
+              <a:t>getName</a:t>
+            </a:r>
+            <a:r>
+              <a:rPr lang="en-US" altLang="ko-KR" sz="2400" dirty="0">
+                <a:latin typeface="나눔고딕 ExtraBold" panose="020D0904000000000000" pitchFamily="50" charset="-127"/>
+                <a:ea typeface="나눔고딕 ExtraBold" panose="020D0904000000000000" pitchFamily="50" charset="-127"/>
+              </a:rPr>
+              <a:t>(name: String):String = name</a:t>
+            </a:r>
+          </a:p>
+          <a:p>
+            <a:endParaRPr lang="en-US" altLang="ko-KR" sz="2400" dirty="0">
+              <a:latin typeface="나눔고딕 ExtraBold" panose="020D0904000000000000" pitchFamily="50" charset="-127"/>
+              <a:ea typeface="나눔고딕 ExtraBold" panose="020D0904000000000000" pitchFamily="50" charset="-127"/>
+            </a:endParaRPr>
+          </a:p>
+          <a:p>
+            <a:endParaRPr lang="en-US" altLang="ko-KR" sz="2400" dirty="0">
+              <a:latin typeface="나눔고딕 ExtraBold" panose="020D0904000000000000" pitchFamily="50" charset="-127"/>
+              <a:ea typeface="나눔고딕 ExtraBold" panose="020D0904000000000000" pitchFamily="50" charset="-127"/>
+            </a:endParaRPr>
+          </a:p>
+        </p:txBody>
+      </p:sp>
+    </p:spTree>
+    <p:extLst>
+      <p:ext uri="{BB962C8B-B14F-4D97-AF65-F5344CB8AC3E}">
+        <p14:creationId xmlns:p14="http://schemas.microsoft.com/office/powerpoint/2010/main" val="2454617337"/>
+      </p:ext>
+    </p:extLst>
+  </p:cSld>
+  <p:clrMapOvr>
+    <a:masterClrMapping/>
+  </p:clrMapOvr>
+</p:sld>
+</file>
+
+<file path=ppt/slides/slide13.xml><?xml version="1.0" encoding="utf-8"?>
 <p:sld xmlns:a="http://schemas.openxmlformats.org/drawingml/2006/main" xmlns:r="http://schemas.openxmlformats.org/officeDocument/2006/relationships" xmlns:p="http://schemas.openxmlformats.org/presentationml/2006/main">
   <p:cSld>
     <p:spTree>
@@ -11033,7 +12017,7 @@
         <p:spPr>
           <a:xfrm>
             <a:off x="134910" y="268909"/>
-            <a:ext cx="11532433" cy="5940088"/>
+            <a:ext cx="11532433" cy="6432530"/>
           </a:xfrm>
           <a:prstGeom prst="rect">
             <a:avLst/>
@@ -11059,6 +12043,12 @@
             </a:endParaRPr>
           </a:p>
           <a:p>
+            <a:endParaRPr lang="en-US" altLang="ko-KR" sz="3200" dirty="0">
+              <a:latin typeface="나눔고딕 ExtraBold" panose="020D0904000000000000" pitchFamily="50" charset="-127"/>
+              <a:ea typeface="나눔고딕 ExtraBold" panose="020D0904000000000000" pitchFamily="50" charset="-127"/>
+            </a:endParaRPr>
+          </a:p>
+          <a:p>
             <a:r>
               <a:rPr lang="ko-KR" altLang="en-US" sz="2000" dirty="0">
                 <a:latin typeface="나눔고딕 ExtraBold" panose="020D0904000000000000" pitchFamily="50" charset="-127"/>
@@ -11204,6 +12194,13 @@
               <a:buChar char="•"/>
             </a:pPr>
             <a:r>
+              <a:rPr lang="en-US" altLang="ko-KR" sz="3200" dirty="0">
+                <a:latin typeface="나눔고딕 ExtraBold" panose="020D0904000000000000" pitchFamily="50" charset="-127"/>
+                <a:ea typeface="나눔고딕 ExtraBold" panose="020D0904000000000000" pitchFamily="50" charset="-127"/>
+              </a:rPr>
+              <a:t>Do it! </a:t>
+            </a:r>
+            <a:r>
               <a:rPr lang="ko-KR" altLang="en-US" sz="3200" dirty="0" err="1">
                 <a:latin typeface="나눔고딕 ExtraBold" panose="020D0904000000000000" pitchFamily="50" charset="-127"/>
                 <a:ea typeface="나눔고딕 ExtraBold" panose="020D0904000000000000" pitchFamily="50" charset="-127"/>
@@ -11215,15 +12212,26 @@
                 <a:latin typeface="나눔고딕 ExtraBold" panose="020D0904000000000000" pitchFamily="50" charset="-127"/>
                 <a:ea typeface="나눔고딕 ExtraBold" panose="020D0904000000000000" pitchFamily="50" charset="-127"/>
               </a:rPr>
-              <a:t> 안드로이드 </a:t>
+              <a:t> 안드로이드 앱 프로그래밍 </a:t>
             </a:r>
             <a:r>
               <a:rPr lang="en-US" altLang="ko-KR" sz="3200" dirty="0">
                 <a:latin typeface="나눔고딕 ExtraBold" panose="020D0904000000000000" pitchFamily="50" charset="-127"/>
                 <a:ea typeface="나눔고딕 ExtraBold" panose="020D0904000000000000" pitchFamily="50" charset="-127"/>
               </a:rPr>
-              <a:t>with Kotlin</a:t>
-            </a:r>
+              <a:t>with </a:t>
+            </a:r>
+            <a:r>
+              <a:rPr lang="ko-KR" altLang="en-US" sz="3200" dirty="0" err="1">
+                <a:latin typeface="나눔고딕 ExtraBold" panose="020D0904000000000000" pitchFamily="50" charset="-127"/>
+                <a:ea typeface="나눔고딕 ExtraBold" panose="020D0904000000000000" pitchFamily="50" charset="-127"/>
+              </a:rPr>
+              <a:t>코틀린</a:t>
+            </a:r>
+            <a:endParaRPr lang="en-US" altLang="ko-KR" sz="3200" dirty="0">
+              <a:latin typeface="나눔고딕 ExtraBold" panose="020D0904000000000000" pitchFamily="50" charset="-127"/>
+              <a:ea typeface="나눔고딕 ExtraBold" panose="020D0904000000000000" pitchFamily="50" charset="-127"/>
+            </a:endParaRPr>
           </a:p>
           <a:p>
             <a:endParaRPr lang="en-US" altLang="ko-KR" sz="3200" dirty="0">
@@ -11300,7 +12308,7 @@
         <p:spPr>
           <a:xfrm>
             <a:off x="1049312" y="428178"/>
-            <a:ext cx="8484433" cy="5262979"/>
+            <a:ext cx="8484433" cy="4278094"/>
           </a:xfrm>
           <a:prstGeom prst="rect">
             <a:avLst/>
@@ -11403,43 +12411,6 @@
             </a:endParaRPr>
           </a:p>
           <a:p>
-            <a:endParaRPr lang="en-US" altLang="ko-KR" sz="3200" dirty="0">
-              <a:latin typeface="HY견고딕" panose="02030600000101010101" pitchFamily="18" charset="-127"/>
-              <a:ea typeface="HY견고딕" panose="02030600000101010101" pitchFamily="18" charset="-127"/>
-            </a:endParaRPr>
-          </a:p>
-          <a:p>
-            <a:pPr marL="457200" indent="-457200">
-              <a:buFont typeface="Arial" panose="020B0604020202020204" pitchFamily="34" charset="0"/>
-              <a:buChar char="•"/>
-            </a:pPr>
-            <a:r>
-              <a:rPr lang="en-US" altLang="ko-KR" sz="3200" dirty="0">
-                <a:latin typeface="HY견고딕" panose="02030600000101010101" pitchFamily="18" charset="-127"/>
-                <a:ea typeface="HY견고딕" panose="02030600000101010101" pitchFamily="18" charset="-127"/>
-              </a:rPr>
-              <a:t>Android</a:t>
-            </a:r>
-            <a:r>
-              <a:rPr lang="ko-KR" altLang="en-US" sz="3200" dirty="0">
-                <a:latin typeface="HY견고딕" panose="02030600000101010101" pitchFamily="18" charset="-127"/>
-                <a:ea typeface="HY견고딕" panose="02030600000101010101" pitchFamily="18" charset="-127"/>
-              </a:rPr>
-              <a:t> 개발에서의 </a:t>
-            </a:r>
-            <a:r>
-              <a:rPr lang="en-US" altLang="ko-KR" sz="3200" dirty="0">
-                <a:latin typeface="HY견고딕" panose="02030600000101010101" pitchFamily="18" charset="-127"/>
-                <a:ea typeface="HY견고딕" panose="02030600000101010101" pitchFamily="18" charset="-127"/>
-              </a:rPr>
-              <a:t>Kotlin</a:t>
-            </a:r>
-          </a:p>
-          <a:p>
-            <a:pPr marL="457200" indent="-457200">
-              <a:buFont typeface="Arial" panose="020B0604020202020204" pitchFamily="34" charset="0"/>
-              <a:buChar char="•"/>
-            </a:pPr>
             <a:endParaRPr lang="en-US" altLang="ko-KR" sz="3200" dirty="0">
               <a:latin typeface="HY견고딕" panose="02030600000101010101" pitchFamily="18" charset="-127"/>
               <a:ea typeface="HY견고딕" panose="02030600000101010101" pitchFamily="18" charset="-127"/>
@@ -11576,53 +12547,6 @@
       </p:pic>
       <p:pic>
         <p:nvPicPr>
-          <p:cNvPr id="5" name="Picture 2" descr="Kotlin Icon.svg">
-            <a:extLst>
-              <a:ext uri="{FF2B5EF4-FFF2-40B4-BE49-F238E27FC236}">
-                <a16:creationId xmlns:a16="http://schemas.microsoft.com/office/drawing/2014/main" id="{B1F4F053-5EAA-45D0-8906-57F5097AA843}"/>
-              </a:ext>
-            </a:extLst>
-          </p:cNvPr>
-          <p:cNvPicPr>
-            <a:picLocks noChangeAspect="1" noChangeArrowheads="1"/>
-          </p:cNvPicPr>
-          <p:nvPr/>
-        </p:nvPicPr>
-        <p:blipFill>
-          <a:blip r:embed="rId2">
-            <a:extLst>
-              <a:ext uri="{28A0092B-C50C-407E-A947-70E740481C1C}">
-                <a14:useLocalDpi xmlns:a14="http://schemas.microsoft.com/office/drawing/2010/main" val="0"/>
-              </a:ext>
-            </a:extLst>
-          </a:blip>
-          <a:srcRect/>
-          <a:stretch>
-            <a:fillRect/>
-          </a:stretch>
-        </p:blipFill>
-        <p:spPr bwMode="auto">
-          <a:xfrm>
-            <a:off x="7375160" y="3659206"/>
-            <a:ext cx="484683" cy="484683"/>
-          </a:xfrm>
-          <a:prstGeom prst="rect">
-            <a:avLst/>
-          </a:prstGeom>
-          <a:noFill/>
-          <a:extLst>
-            <a:ext uri="{909E8E84-426E-40DD-AFC4-6F175D3DCCD1}">
-              <a14:hiddenFill xmlns:a14="http://schemas.microsoft.com/office/drawing/2010/main">
-                <a:solidFill>
-                  <a:srgbClr val="FFFFFF"/>
-                </a:solidFill>
-              </a14:hiddenFill>
-            </a:ext>
-          </a:extLst>
-        </p:spPr>
-      </p:pic>
-      <p:pic>
-        <p:nvPicPr>
           <p:cNvPr id="6" name="Picture 2" descr="Kotlin Icon.svg">
             <a:extLst>
               <a:ext uri="{FF2B5EF4-FFF2-40B4-BE49-F238E27FC236}">
@@ -11650,7 +12574,7 @@
         </p:blipFill>
         <p:spPr bwMode="auto">
           <a:xfrm>
-            <a:off x="4049842" y="4621075"/>
+            <a:off x="4015976" y="3698208"/>
             <a:ext cx="484683" cy="484683"/>
           </a:xfrm>
           <a:prstGeom prst="rect">
@@ -13588,389 +14512,6 @@
           <a:chExt cx="0" cy="0"/>
         </a:xfrm>
       </p:grpSpPr>
-      <p:pic>
-        <p:nvPicPr>
-          <p:cNvPr id="2" name="Picture 2" descr="Kotlin Icon.svg">
-            <a:extLst>
-              <a:ext uri="{FF2B5EF4-FFF2-40B4-BE49-F238E27FC236}">
-                <a16:creationId xmlns:a16="http://schemas.microsoft.com/office/drawing/2014/main" id="{30D2BCDF-6A8C-453B-BC04-1C3B1B2C0A58}"/>
-              </a:ext>
-            </a:extLst>
-          </p:cNvPr>
-          <p:cNvPicPr>
-            <a:picLocks noChangeAspect="1" noChangeArrowheads="1"/>
-          </p:cNvPicPr>
-          <p:nvPr/>
-        </p:nvPicPr>
-        <p:blipFill>
-          <a:blip r:embed="rId2">
-            <a:extLst>
-              <a:ext uri="{28A0092B-C50C-407E-A947-70E740481C1C}">
-                <a14:useLocalDpi xmlns:a14="http://schemas.microsoft.com/office/drawing/2010/main" val="0"/>
-              </a:ext>
-            </a:extLst>
-          </a:blip>
-          <a:srcRect/>
-          <a:stretch>
-            <a:fillRect/>
-          </a:stretch>
-        </p:blipFill>
-        <p:spPr bwMode="auto">
-          <a:xfrm>
-            <a:off x="974360" y="1978702"/>
-            <a:ext cx="1900003" cy="1900003"/>
-          </a:xfrm>
-          <a:prstGeom prst="rect">
-            <a:avLst/>
-          </a:prstGeom>
-          <a:noFill/>
-          <a:extLst>
-            <a:ext uri="{909E8E84-426E-40DD-AFC4-6F175D3DCCD1}">
-              <a14:hiddenFill xmlns:a14="http://schemas.microsoft.com/office/drawing/2010/main">
-                <a:solidFill>
-                  <a:srgbClr val="FFFFFF"/>
-                </a:solidFill>
-              </a14:hiddenFill>
-            </a:ext>
-          </a:extLst>
-        </p:spPr>
-      </p:pic>
-      <p:sp>
-        <p:nvSpPr>
-          <p:cNvPr id="3" name="TextBox 2">
-            <a:extLst>
-              <a:ext uri="{FF2B5EF4-FFF2-40B4-BE49-F238E27FC236}">
-                <a16:creationId xmlns:a16="http://schemas.microsoft.com/office/drawing/2014/main" id="{0CDADB4E-741D-47A0-AC6B-530B20A1A1D9}"/>
-              </a:ext>
-            </a:extLst>
-          </p:cNvPr>
-          <p:cNvSpPr txBox="1"/>
-          <p:nvPr/>
-        </p:nvSpPr>
-        <p:spPr>
-          <a:xfrm>
-            <a:off x="3822491" y="734517"/>
-            <a:ext cx="7240250" cy="4893647"/>
-          </a:xfrm>
-          <a:prstGeom prst="rect">
-            <a:avLst/>
-          </a:prstGeom>
-          <a:noFill/>
-        </p:spPr>
-        <p:txBody>
-          <a:bodyPr wrap="square" rtlCol="0">
-            <a:spAutoFit/>
-          </a:bodyPr>
-          <a:lstStyle/>
-          <a:p>
-            <a:r>
-              <a:rPr lang="en-US" altLang="ko-KR" sz="2400" b="1" dirty="0">
-                <a:latin typeface="나눔고딕 ExtraBold" panose="020D0904000000000000" pitchFamily="50" charset="-127"/>
-                <a:ea typeface="나눔고딕 ExtraBold" panose="020D0904000000000000" pitchFamily="50" charset="-127"/>
-              </a:rPr>
-              <a:t>Android developers </a:t>
-            </a:r>
-            <a:r>
-              <a:rPr lang="ko-KR" altLang="en-US" sz="2400" b="1" dirty="0">
-                <a:latin typeface="나눔고딕 ExtraBold" panose="020D0904000000000000" pitchFamily="50" charset="-127"/>
-                <a:ea typeface="나눔고딕 ExtraBold" panose="020D0904000000000000" pitchFamily="50" charset="-127"/>
-              </a:rPr>
-              <a:t>사이트의 </a:t>
-            </a:r>
-            <a:r>
-              <a:rPr lang="en-US" altLang="ko-KR" sz="2400" b="1" dirty="0">
-                <a:latin typeface="나눔고딕 ExtraBold" panose="020D0904000000000000" pitchFamily="50" charset="-127"/>
-                <a:ea typeface="나눔고딕 ExtraBold" panose="020D0904000000000000" pitchFamily="50" charset="-127"/>
-              </a:rPr>
-              <a:t>Kotlin</a:t>
-            </a:r>
-            <a:r>
-              <a:rPr lang="ko-KR" altLang="en-US" sz="2400" b="1" dirty="0">
-                <a:latin typeface="나눔고딕 ExtraBold" panose="020D0904000000000000" pitchFamily="50" charset="-127"/>
-                <a:ea typeface="나눔고딕 ExtraBold" panose="020D0904000000000000" pitchFamily="50" charset="-127"/>
-              </a:rPr>
-              <a:t> 소개이다</a:t>
-            </a:r>
-            <a:r>
-              <a:rPr lang="en-US" altLang="ko-KR" sz="2400" b="1" dirty="0">
-                <a:latin typeface="나눔고딕 ExtraBold" panose="020D0904000000000000" pitchFamily="50" charset="-127"/>
-                <a:ea typeface="나눔고딕 ExtraBold" panose="020D0904000000000000" pitchFamily="50" charset="-127"/>
-              </a:rPr>
-              <a:t>.</a:t>
-            </a:r>
-          </a:p>
-          <a:p>
-            <a:endParaRPr lang="en-US" altLang="ko-KR" sz="2400" b="1" dirty="0">
-              <a:latin typeface="나눔고딕 ExtraBold" panose="020D0904000000000000" pitchFamily="50" charset="-127"/>
-              <a:ea typeface="나눔고딕 ExtraBold" panose="020D0904000000000000" pitchFamily="50" charset="-127"/>
-            </a:endParaRPr>
-          </a:p>
-          <a:p>
-            <a:r>
-              <a:rPr lang="ko-KR" altLang="en-US" sz="2400" b="1" dirty="0">
-                <a:latin typeface="나눔고딕 ExtraBold" panose="020D0904000000000000" pitchFamily="50" charset="-127"/>
-                <a:ea typeface="나눔고딕 ExtraBold" panose="020D0904000000000000" pitchFamily="50" charset="-127"/>
-              </a:rPr>
-              <a:t>표현력이 높고 간결하다</a:t>
-            </a:r>
-            <a:r>
-              <a:rPr lang="en-US" altLang="ko-KR" sz="2400" b="1" dirty="0">
-                <a:latin typeface="나눔고딕 ExtraBold" panose="020D0904000000000000" pitchFamily="50" charset="-127"/>
-                <a:ea typeface="나눔고딕 ExtraBold" panose="020D0904000000000000" pitchFamily="50" charset="-127"/>
-              </a:rPr>
-              <a:t>. </a:t>
-            </a:r>
-            <a:r>
-              <a:rPr lang="en-US" altLang="ko-KR" sz="2400" b="1" dirty="0">
-                <a:latin typeface="나눔고딕 ExtraBold" panose="020D0904000000000000" pitchFamily="50" charset="-127"/>
-                <a:ea typeface="나눔고딕 ExtraBold" panose="020D0904000000000000" pitchFamily="50" charset="-127"/>
-                <a:sym typeface="Wingdings" panose="05000000000000000000" pitchFamily="2" charset="2"/>
-              </a:rPr>
-              <a:t> </a:t>
-            </a:r>
-            <a:r>
-              <a:rPr lang="ko-KR" altLang="en-US" sz="2400" b="1" dirty="0">
-                <a:latin typeface="나눔고딕 ExtraBold" panose="020D0904000000000000" pitchFamily="50" charset="-127"/>
-                <a:ea typeface="나눔고딕 ExtraBold" panose="020D0904000000000000" pitchFamily="50" charset="-127"/>
-                <a:sym typeface="Wingdings" panose="05000000000000000000" pitchFamily="2" charset="2"/>
-              </a:rPr>
-              <a:t>최신 언어 기능을 통해 간략한 작성이 가능</a:t>
-            </a:r>
-            <a:endParaRPr lang="en-US" altLang="ko-KR" sz="2400" b="1" dirty="0">
-              <a:latin typeface="나눔고딕 ExtraBold" panose="020D0904000000000000" pitchFamily="50" charset="-127"/>
-              <a:ea typeface="나눔고딕 ExtraBold" panose="020D0904000000000000" pitchFamily="50" charset="-127"/>
-              <a:sym typeface="Wingdings" panose="05000000000000000000" pitchFamily="2" charset="2"/>
-            </a:endParaRPr>
-          </a:p>
-          <a:p>
-            <a:endParaRPr lang="en-US" altLang="ko-KR" sz="2400" b="1" dirty="0">
-              <a:latin typeface="나눔고딕 ExtraBold" panose="020D0904000000000000" pitchFamily="50" charset="-127"/>
-              <a:ea typeface="나눔고딕 ExtraBold" panose="020D0904000000000000" pitchFamily="50" charset="-127"/>
-              <a:sym typeface="Wingdings" panose="05000000000000000000" pitchFamily="2" charset="2"/>
-            </a:endParaRPr>
-          </a:p>
-          <a:p>
-            <a:r>
-              <a:rPr lang="ko-KR" altLang="en-US" sz="2400" b="1" dirty="0">
-                <a:latin typeface="나눔고딕 ExtraBold" panose="020D0904000000000000" pitchFamily="50" charset="-127"/>
-                <a:ea typeface="나눔고딕 ExtraBold" panose="020D0904000000000000" pitchFamily="50" charset="-127"/>
-                <a:sym typeface="Wingdings" panose="05000000000000000000" pitchFamily="2" charset="2"/>
-              </a:rPr>
-              <a:t>더 안전한 코드 </a:t>
-            </a:r>
-            <a:r>
-              <a:rPr lang="en-US" altLang="ko-KR" sz="2400" b="1" dirty="0">
-                <a:latin typeface="나눔고딕 ExtraBold" panose="020D0904000000000000" pitchFamily="50" charset="-127"/>
-                <a:ea typeface="나눔고딕 ExtraBold" panose="020D0904000000000000" pitchFamily="50" charset="-127"/>
-                <a:sym typeface="Wingdings" panose="05000000000000000000" pitchFamily="2" charset="2"/>
-              </a:rPr>
-              <a:t> Java</a:t>
-            </a:r>
-            <a:r>
-              <a:rPr lang="ko-KR" altLang="en-US" sz="2400" b="1" dirty="0">
-                <a:latin typeface="나눔고딕 ExtraBold" panose="020D0904000000000000" pitchFamily="50" charset="-127"/>
-                <a:ea typeface="나눔고딕 ExtraBold" panose="020D0904000000000000" pitchFamily="50" charset="-127"/>
-                <a:sym typeface="Wingdings" panose="05000000000000000000" pitchFamily="2" charset="2"/>
-              </a:rPr>
-              <a:t>에 비해 안전하고</a:t>
-            </a:r>
-            <a:r>
-              <a:rPr lang="en-US" altLang="ko-KR" sz="2400" b="1" dirty="0">
-                <a:latin typeface="나눔고딕 ExtraBold" panose="020D0904000000000000" pitchFamily="50" charset="-127"/>
-                <a:ea typeface="나눔고딕 ExtraBold" panose="020D0904000000000000" pitchFamily="50" charset="-127"/>
-                <a:sym typeface="Wingdings" panose="05000000000000000000" pitchFamily="2" charset="2"/>
-              </a:rPr>
-              <a:t>, </a:t>
-            </a:r>
-            <a:r>
-              <a:rPr lang="ko-KR" altLang="en-US" sz="2400" b="1" dirty="0">
-                <a:latin typeface="나눔고딕 ExtraBold" panose="020D0904000000000000" pitchFamily="50" charset="-127"/>
-                <a:ea typeface="나눔고딕 ExtraBold" panose="020D0904000000000000" pitchFamily="50" charset="-127"/>
-                <a:sym typeface="Wingdings" panose="05000000000000000000" pitchFamily="2" charset="2"/>
-              </a:rPr>
-              <a:t>앱이 다운될 확률이 </a:t>
-            </a:r>
-            <a:r>
-              <a:rPr lang="en-US" altLang="ko-KR" sz="2400" b="1" dirty="0">
-                <a:latin typeface="나눔고딕 ExtraBold" panose="020D0904000000000000" pitchFamily="50" charset="-127"/>
-                <a:ea typeface="나눔고딕 ExtraBold" panose="020D0904000000000000" pitchFamily="50" charset="-127"/>
-                <a:sym typeface="Wingdings" panose="05000000000000000000" pitchFamily="2" charset="2"/>
-              </a:rPr>
-              <a:t>20%</a:t>
-            </a:r>
-            <a:r>
-              <a:rPr lang="ko-KR" altLang="en-US" sz="2400" b="1" dirty="0">
-                <a:latin typeface="나눔고딕 ExtraBold" panose="020D0904000000000000" pitchFamily="50" charset="-127"/>
-                <a:ea typeface="나눔고딕 ExtraBold" panose="020D0904000000000000" pitchFamily="50" charset="-127"/>
-                <a:sym typeface="Wingdings" panose="05000000000000000000" pitchFamily="2" charset="2"/>
-              </a:rPr>
-              <a:t>이상 낮아진다</a:t>
-            </a:r>
-            <a:r>
-              <a:rPr lang="en-US" altLang="ko-KR" sz="2400" b="1" dirty="0">
-                <a:latin typeface="나눔고딕 ExtraBold" panose="020D0904000000000000" pitchFamily="50" charset="-127"/>
-                <a:ea typeface="나눔고딕 ExtraBold" panose="020D0904000000000000" pitchFamily="50" charset="-127"/>
-                <a:sym typeface="Wingdings" panose="05000000000000000000" pitchFamily="2" charset="2"/>
-              </a:rPr>
-              <a:t>.</a:t>
-            </a:r>
-          </a:p>
-          <a:p>
-            <a:endParaRPr lang="en-US" altLang="ko-KR" sz="2400" b="1" dirty="0">
-              <a:latin typeface="나눔고딕 ExtraBold" panose="020D0904000000000000" pitchFamily="50" charset="-127"/>
-              <a:ea typeface="나눔고딕 ExtraBold" panose="020D0904000000000000" pitchFamily="50" charset="-127"/>
-              <a:sym typeface="Wingdings" panose="05000000000000000000" pitchFamily="2" charset="2"/>
-            </a:endParaRPr>
-          </a:p>
-          <a:p>
-            <a:r>
-              <a:rPr lang="ko-KR" altLang="en-US" sz="2400" b="1" dirty="0">
-                <a:latin typeface="나눔고딕 ExtraBold" panose="020D0904000000000000" pitchFamily="50" charset="-127"/>
-                <a:ea typeface="나눔고딕 ExtraBold" panose="020D0904000000000000" pitchFamily="50" charset="-127"/>
-                <a:sym typeface="Wingdings" panose="05000000000000000000" pitchFamily="2" charset="2"/>
-              </a:rPr>
-              <a:t>상호운용 가능 </a:t>
-            </a:r>
-            <a:r>
-              <a:rPr lang="en-US" altLang="ko-KR" sz="2400" b="1" dirty="0">
-                <a:latin typeface="나눔고딕 ExtraBold" panose="020D0904000000000000" pitchFamily="50" charset="-127"/>
-                <a:ea typeface="나눔고딕 ExtraBold" panose="020D0904000000000000" pitchFamily="50" charset="-127"/>
-                <a:sym typeface="Wingdings" panose="05000000000000000000" pitchFamily="2" charset="2"/>
-              </a:rPr>
-              <a:t> </a:t>
-            </a:r>
-            <a:r>
-              <a:rPr lang="ko-KR" altLang="en-US" sz="2400" b="1" dirty="0">
-                <a:latin typeface="나눔고딕 ExtraBold" panose="020D0904000000000000" pitchFamily="50" charset="-127"/>
-                <a:ea typeface="나눔고딕 ExtraBold" panose="020D0904000000000000" pitchFamily="50" charset="-127"/>
-              </a:rPr>
-              <a:t>사실 </a:t>
-            </a:r>
-            <a:r>
-              <a:rPr lang="en-US" altLang="ko-KR" sz="2400" b="1" dirty="0">
-                <a:latin typeface="나눔고딕 ExtraBold" panose="020D0904000000000000" pitchFamily="50" charset="-127"/>
-                <a:ea typeface="나눔고딕 ExtraBold" panose="020D0904000000000000" pitchFamily="50" charset="-127"/>
-              </a:rPr>
-              <a:t>Kotlin</a:t>
-            </a:r>
-            <a:r>
-              <a:rPr lang="ko-KR" altLang="en-US" sz="2400" b="1" dirty="0">
-                <a:latin typeface="나눔고딕 ExtraBold" panose="020D0904000000000000" pitchFamily="50" charset="-127"/>
-                <a:ea typeface="나눔고딕 ExtraBold" panose="020D0904000000000000" pitchFamily="50" charset="-127"/>
-              </a:rPr>
-              <a:t>은 </a:t>
-            </a:r>
-            <a:r>
-              <a:rPr lang="en-US" altLang="ko-KR" sz="2400" b="1" dirty="0">
-                <a:latin typeface="나눔고딕 ExtraBold" panose="020D0904000000000000" pitchFamily="50" charset="-127"/>
-                <a:ea typeface="나눔고딕 ExtraBold" panose="020D0904000000000000" pitchFamily="50" charset="-127"/>
-              </a:rPr>
-              <a:t>Java</a:t>
-            </a:r>
-            <a:r>
-              <a:rPr lang="ko-KR" altLang="en-US" sz="2400" b="1" dirty="0">
-                <a:latin typeface="나눔고딕 ExtraBold" panose="020D0904000000000000" pitchFamily="50" charset="-127"/>
-                <a:ea typeface="나눔고딕 ExtraBold" panose="020D0904000000000000" pitchFamily="50" charset="-127"/>
-              </a:rPr>
-              <a:t>와 </a:t>
-            </a:r>
-            <a:r>
-              <a:rPr lang="en-US" altLang="ko-KR" sz="2400" b="1" dirty="0">
-                <a:latin typeface="나눔고딕 ExtraBold" panose="020D0904000000000000" pitchFamily="50" charset="-127"/>
-                <a:ea typeface="나눔고딕 ExtraBold" panose="020D0904000000000000" pitchFamily="50" charset="-127"/>
-              </a:rPr>
-              <a:t>100% </a:t>
-            </a:r>
-            <a:r>
-              <a:rPr lang="ko-KR" altLang="en-US" sz="2400" b="1" dirty="0">
-                <a:latin typeface="나눔고딕 ExtraBold" panose="020D0904000000000000" pitchFamily="50" charset="-127"/>
-                <a:ea typeface="나눔고딕 ExtraBold" panose="020D0904000000000000" pitchFamily="50" charset="-127"/>
-              </a:rPr>
-              <a:t>호환된다</a:t>
-            </a:r>
-            <a:r>
-              <a:rPr lang="en-US" altLang="ko-KR" sz="2400" b="1" dirty="0">
-                <a:latin typeface="나눔고딕 ExtraBold" panose="020D0904000000000000" pitchFamily="50" charset="-127"/>
-                <a:ea typeface="나눔고딕 ExtraBold" panose="020D0904000000000000" pitchFamily="50" charset="-127"/>
-              </a:rPr>
-              <a:t>.</a:t>
-            </a:r>
-          </a:p>
-          <a:p>
-            <a:endParaRPr lang="en-US" altLang="ko-KR" sz="2400" b="1" dirty="0">
-              <a:latin typeface="나눔고딕 ExtraBold" panose="020D0904000000000000" pitchFamily="50" charset="-127"/>
-              <a:ea typeface="나눔고딕 ExtraBold" panose="020D0904000000000000" pitchFamily="50" charset="-127"/>
-            </a:endParaRPr>
-          </a:p>
-          <a:p>
-            <a:r>
-              <a:rPr lang="ko-KR" altLang="en-US" sz="2400" b="1" dirty="0">
-                <a:latin typeface="나눔고딕 ExtraBold" panose="020D0904000000000000" pitchFamily="50" charset="-127"/>
-                <a:ea typeface="나눔고딕 ExtraBold" panose="020D0904000000000000" pitchFamily="50" charset="-127"/>
-              </a:rPr>
-              <a:t>구조화된 동시 실행 </a:t>
-            </a:r>
-            <a:r>
-              <a:rPr lang="en-US" altLang="ko-KR" sz="2400" b="1" dirty="0">
-                <a:latin typeface="나눔고딕 ExtraBold" panose="020D0904000000000000" pitchFamily="50" charset="-127"/>
-                <a:ea typeface="나눔고딕 ExtraBold" panose="020D0904000000000000" pitchFamily="50" charset="-127"/>
-                <a:sym typeface="Wingdings" panose="05000000000000000000" pitchFamily="2" charset="2"/>
-              </a:rPr>
-              <a:t> Kotlin Coroutine</a:t>
-            </a:r>
-            <a:r>
-              <a:rPr lang="ko-KR" altLang="en-US" sz="2400" b="1" dirty="0">
-                <a:latin typeface="나눔고딕 ExtraBold" panose="020D0904000000000000" pitchFamily="50" charset="-127"/>
-                <a:ea typeface="나눔고딕 ExtraBold" panose="020D0904000000000000" pitchFamily="50" charset="-127"/>
-                <a:sym typeface="Wingdings" panose="05000000000000000000" pitchFamily="2" charset="2"/>
-              </a:rPr>
-              <a:t>을 사용해 비동기 처리와 서버 통신이 더 쉬워진다</a:t>
-            </a:r>
-            <a:r>
-              <a:rPr lang="en-US" altLang="ko-KR" sz="2400" b="1" dirty="0">
-                <a:latin typeface="나눔고딕 ExtraBold" panose="020D0904000000000000" pitchFamily="50" charset="-127"/>
-                <a:ea typeface="나눔고딕 ExtraBold" panose="020D0904000000000000" pitchFamily="50" charset="-127"/>
-                <a:sym typeface="Wingdings" panose="05000000000000000000" pitchFamily="2" charset="2"/>
-              </a:rPr>
-              <a:t>.</a:t>
-            </a:r>
-            <a:endParaRPr lang="en-US" altLang="ko-KR" sz="2400" b="1" dirty="0">
-              <a:latin typeface="나눔고딕 ExtraBold" panose="020D0904000000000000" pitchFamily="50" charset="-127"/>
-              <a:ea typeface="나눔고딕 ExtraBold" panose="020D0904000000000000" pitchFamily="50" charset="-127"/>
-            </a:endParaRPr>
-          </a:p>
-        </p:txBody>
-      </p:sp>
-    </p:spTree>
-    <p:extLst>
-      <p:ext uri="{BB962C8B-B14F-4D97-AF65-F5344CB8AC3E}">
-        <p14:creationId xmlns:p14="http://schemas.microsoft.com/office/powerpoint/2010/main" val="1447293889"/>
-      </p:ext>
-    </p:extLst>
-  </p:cSld>
-  <p:clrMapOvr>
-    <a:masterClrMapping/>
-  </p:clrMapOvr>
-</p:sld>
-</file>
-
-<file path=ppt/slides/slide8.xml><?xml version="1.0" encoding="utf-8"?>
-<p:sld xmlns:a="http://schemas.openxmlformats.org/drawingml/2006/main" xmlns:r="http://schemas.openxmlformats.org/officeDocument/2006/relationships" xmlns:p="http://schemas.openxmlformats.org/presentationml/2006/main">
-  <p:cSld>
-    <p:spTree>
-      <p:nvGrpSpPr>
-        <p:cNvPr id="1" name=""/>
-        <p:cNvGrpSpPr/>
-        <p:nvPr/>
-      </p:nvGrpSpPr>
-      <p:grpSpPr>
-        <a:xfrm>
-          <a:off x="0" y="0"/>
-          <a:ext cx="0" cy="0"/>
-          <a:chOff x="0" y="0"/>
-          <a:chExt cx="0" cy="0"/>
-        </a:xfrm>
-      </p:grpSpPr>
       <p:sp>
         <p:nvSpPr>
           <p:cNvPr id="2" name="TextBox 1">
@@ -14023,7 +14564,7 @@
         </p:nvSpPr>
         <p:spPr>
           <a:xfrm>
-            <a:off x="449705" y="1074507"/>
+            <a:off x="449705" y="883781"/>
             <a:ext cx="11137693" cy="4893647"/>
           </a:xfrm>
           <a:prstGeom prst="rect">
@@ -14037,43 +14578,6 @@
           </a:bodyPr>
           <a:lstStyle/>
           <a:p>
-            <a:r>
-              <a:rPr lang="en-US" altLang="ko-KR" sz="2400" dirty="0">
-                <a:latin typeface="나눔고딕 ExtraBold" panose="020D0904000000000000" pitchFamily="50" charset="-127"/>
-                <a:ea typeface="나눔고딕 ExtraBold" panose="020D0904000000000000" pitchFamily="50" charset="-127"/>
-              </a:rPr>
-              <a:t>Java</a:t>
-            </a:r>
-            <a:r>
-              <a:rPr lang="ko-KR" altLang="en-US" sz="2400" dirty="0">
-                <a:latin typeface="나눔고딕 ExtraBold" panose="020D0904000000000000" pitchFamily="50" charset="-127"/>
-                <a:ea typeface="나눔고딕 ExtraBold" panose="020D0904000000000000" pitchFamily="50" charset="-127"/>
-              </a:rPr>
-              <a:t>는 어떤 개발이든 사용하기 좋고</a:t>
-            </a:r>
-            <a:r>
-              <a:rPr lang="en-US" altLang="ko-KR" sz="2400" dirty="0">
-                <a:latin typeface="나눔고딕 ExtraBold" panose="020D0904000000000000" pitchFamily="50" charset="-127"/>
-                <a:ea typeface="나눔고딕 ExtraBold" panose="020D0904000000000000" pitchFamily="50" charset="-127"/>
-              </a:rPr>
-              <a:t>, </a:t>
-            </a:r>
-            <a:r>
-              <a:rPr lang="ko-KR" altLang="en-US" sz="2400" dirty="0">
-                <a:latin typeface="나눔고딕 ExtraBold" panose="020D0904000000000000" pitchFamily="50" charset="-127"/>
-                <a:ea typeface="나눔고딕 ExtraBold" panose="020D0904000000000000" pitchFamily="50" charset="-127"/>
-              </a:rPr>
-              <a:t>뛰어난 언어이지만</a:t>
-            </a:r>
-            <a:r>
-              <a:rPr lang="en-US" altLang="ko-KR" sz="2400" dirty="0">
-                <a:latin typeface="나눔고딕 ExtraBold" panose="020D0904000000000000" pitchFamily="50" charset="-127"/>
-                <a:ea typeface="나눔고딕 ExtraBold" panose="020D0904000000000000" pitchFamily="50" charset="-127"/>
-              </a:rPr>
-              <a:t>,</a:t>
-            </a:r>
-          </a:p>
-          <a:p>
             <a:endParaRPr lang="en-US" altLang="ko-KR" sz="2400" dirty="0">
               <a:latin typeface="나눔고딕 ExtraBold" panose="020D0904000000000000" pitchFamily="50" charset="-127"/>
               <a:ea typeface="나눔고딕 ExtraBold" panose="020D0904000000000000" pitchFamily="50" charset="-127"/>
@@ -14105,7 +14609,7 @@
                 <a:latin typeface="나눔고딕 ExtraBold" panose="020D0904000000000000" pitchFamily="50" charset="-127"/>
                 <a:ea typeface="나눔고딕 ExtraBold" panose="020D0904000000000000" pitchFamily="50" charset="-127"/>
               </a:rPr>
-              <a:t>이 점은 시간이 지나면 해결 될 거라 생각할 수 있다</a:t>
+              <a:t>이러한 점은 시간이 지나면 해결 될 거라 생각할 수 있다</a:t>
             </a:r>
             <a:r>
               <a:rPr lang="en-US" altLang="ko-KR" sz="2400" dirty="0">
@@ -14113,6 +14617,29 @@
                 <a:ea typeface="나눔고딕 ExtraBold" panose="020D0904000000000000" pitchFamily="50" charset="-127"/>
               </a:rPr>
               <a:t>.</a:t>
+            </a:r>
+          </a:p>
+          <a:p>
+            <a:r>
+              <a:rPr lang="en-US" altLang="ko-KR" sz="2400" dirty="0">
+                <a:latin typeface="나눔고딕 ExtraBold" panose="020D0904000000000000" pitchFamily="50" charset="-127"/>
+                <a:ea typeface="나눔고딕 ExtraBold" panose="020D0904000000000000" pitchFamily="50" charset="-127"/>
+              </a:rPr>
+              <a:t>(</a:t>
+            </a:r>
+            <a:r>
+              <a:rPr lang="ko-KR" altLang="en-US" sz="2400" dirty="0">
+                <a:latin typeface="나눔고딕 ExtraBold" panose="020D0904000000000000" pitchFamily="50" charset="-127"/>
+                <a:ea typeface="나눔고딕 ExtraBold" panose="020D0904000000000000" pitchFamily="50" charset="-127"/>
+              </a:rPr>
+              <a:t>사실 어느정도는 해결되었다</a:t>
+            </a:r>
+            <a:r>
+              <a:rPr lang="en-US" altLang="ko-KR" sz="2400" dirty="0">
+                <a:latin typeface="나눔고딕 ExtraBold" panose="020D0904000000000000" pitchFamily="50" charset="-127"/>
+                <a:ea typeface="나눔고딕 ExtraBold" panose="020D0904000000000000" pitchFamily="50" charset="-127"/>
+              </a:rPr>
+              <a:t>)</a:t>
             </a:r>
           </a:p>
           <a:p>
@@ -14487,7 +15014,7 @@
 </p:sld>
 </file>
 
-<file path=ppt/slides/slide9.xml><?xml version="1.0" encoding="utf-8"?>
+<file path=ppt/slides/slide8.xml><?xml version="1.0" encoding="utf-8"?>
 <p:sld xmlns:a="http://schemas.openxmlformats.org/drawingml/2006/main" xmlns:r="http://schemas.openxmlformats.org/officeDocument/2006/relationships" xmlns:p="http://schemas.openxmlformats.org/presentationml/2006/main">
   <p:cSld>
     <p:spTree>
@@ -14625,10 +15152,628 @@
           </p:txBody>
         </p:sp>
       </p:grpSp>
+      <p:pic>
+        <p:nvPicPr>
+          <p:cNvPr id="1026" name="Picture 2" descr="무료] 안드로이드 스튜디오로 안드로이드 앱 만들기 - 인프런 | 강의">
+            <a:extLst>
+              <a:ext uri="{FF2B5EF4-FFF2-40B4-BE49-F238E27FC236}">
+                <a16:creationId xmlns:a16="http://schemas.microsoft.com/office/drawing/2014/main" id="{0EAD5850-6DAA-4A63-A514-C37A960D6333}"/>
+              </a:ext>
+            </a:extLst>
+          </p:cNvPr>
+          <p:cNvPicPr>
+            <a:picLocks noChangeAspect="1" noChangeArrowheads="1"/>
+          </p:cNvPicPr>
+          <p:nvPr/>
+        </p:nvPicPr>
+        <p:blipFill>
+          <a:blip r:embed="rId3">
+            <a:extLst>
+              <a:ext uri="{28A0092B-C50C-407E-A947-70E740481C1C}">
+                <a14:useLocalDpi xmlns:a14="http://schemas.microsoft.com/office/drawing/2010/main" val="0"/>
+              </a:ext>
+            </a:extLst>
+          </a:blip>
+          <a:srcRect/>
+          <a:stretch>
+            <a:fillRect/>
+          </a:stretch>
+        </p:blipFill>
+        <p:spPr bwMode="auto">
+          <a:xfrm>
+            <a:off x="846667" y="2562047"/>
+            <a:ext cx="5249333" cy="3417535"/>
+          </a:xfrm>
+          <a:prstGeom prst="rect">
+            <a:avLst/>
+          </a:prstGeom>
+          <a:noFill/>
+          <a:extLst>
+            <a:ext uri="{909E8E84-426E-40DD-AFC4-6F175D3DCCD1}">
+              <a14:hiddenFill xmlns:a14="http://schemas.microsoft.com/office/drawing/2010/main">
+                <a:solidFill>
+                  <a:srgbClr val="FFFFFF"/>
+                </a:solidFill>
+              </a14:hiddenFill>
+            </a:ext>
+          </a:extLst>
+        </p:spPr>
+      </p:pic>
+      <p:sp>
+        <p:nvSpPr>
+          <p:cNvPr id="5" name="더하기 기호 4">
+            <a:extLst>
+              <a:ext uri="{FF2B5EF4-FFF2-40B4-BE49-F238E27FC236}">
+                <a16:creationId xmlns:a16="http://schemas.microsoft.com/office/drawing/2014/main" id="{EA4BB3AB-5829-4842-96ED-068A47D2ED04}"/>
+              </a:ext>
+            </a:extLst>
+          </p:cNvPr>
+          <p:cNvSpPr/>
+          <p:nvPr/>
+        </p:nvSpPr>
+        <p:spPr>
+          <a:xfrm>
+            <a:off x="6155753" y="3665447"/>
+            <a:ext cx="947782" cy="1109753"/>
+          </a:xfrm>
+          <a:prstGeom prst="mathPlus">
+            <a:avLst>
+              <a:gd name="adj1" fmla="val 12709"/>
+            </a:avLst>
+          </a:prstGeom>
+          <a:solidFill>
+            <a:schemeClr val="tx1"/>
+          </a:solidFill>
+          <a:ln>
+            <a:noFill/>
+          </a:ln>
+        </p:spPr>
+        <p:style>
+          <a:lnRef idx="2">
+            <a:schemeClr val="accent1">
+              <a:shade val="50000"/>
+            </a:schemeClr>
+          </a:lnRef>
+          <a:fillRef idx="1">
+            <a:schemeClr val="accent1"/>
+          </a:fillRef>
+          <a:effectRef idx="0">
+            <a:schemeClr val="accent1"/>
+          </a:effectRef>
+          <a:fontRef idx="minor">
+            <a:schemeClr val="lt1"/>
+          </a:fontRef>
+        </p:style>
+        <p:txBody>
+          <a:bodyPr rtlCol="0" anchor="ctr"/>
+          <a:lstStyle/>
+          <a:p>
+            <a:pPr algn="ctr"/>
+            <a:endParaRPr lang="ko-KR" altLang="en-US"/>
+          </a:p>
+        </p:txBody>
+      </p:sp>
+      <p:pic>
+        <p:nvPicPr>
+          <p:cNvPr id="7" name="Picture 2" descr="Kotlin Icon.svg">
+            <a:extLst>
+              <a:ext uri="{FF2B5EF4-FFF2-40B4-BE49-F238E27FC236}">
+                <a16:creationId xmlns:a16="http://schemas.microsoft.com/office/drawing/2014/main" id="{20D9A0D4-ED29-4CAE-9E09-59A19FE0F1EC}"/>
+              </a:ext>
+            </a:extLst>
+          </p:cNvPr>
+          <p:cNvPicPr>
+            <a:picLocks noChangeAspect="1" noChangeArrowheads="1"/>
+          </p:cNvPicPr>
+          <p:nvPr/>
+        </p:nvPicPr>
+        <p:blipFill>
+          <a:blip r:embed="rId2">
+            <a:extLst>
+              <a:ext uri="{28A0092B-C50C-407E-A947-70E740481C1C}">
+                <a14:useLocalDpi xmlns:a14="http://schemas.microsoft.com/office/drawing/2010/main" val="0"/>
+              </a:ext>
+            </a:extLst>
+          </a:blip>
+          <a:srcRect/>
+          <a:stretch>
+            <a:fillRect/>
+          </a:stretch>
+        </p:blipFill>
+        <p:spPr bwMode="auto">
+          <a:xfrm>
+            <a:off x="7334075" y="2982210"/>
+            <a:ext cx="2334857" cy="2334857"/>
+          </a:xfrm>
+          <a:prstGeom prst="rect">
+            <a:avLst/>
+          </a:prstGeom>
+          <a:noFill/>
+          <a:extLst>
+            <a:ext uri="{909E8E84-426E-40DD-AFC4-6F175D3DCCD1}">
+              <a14:hiddenFill xmlns:a14="http://schemas.microsoft.com/office/drawing/2010/main">
+                <a:solidFill>
+                  <a:srgbClr val="FFFFFF"/>
+                </a:solidFill>
+              </a14:hiddenFill>
+            </a:ext>
+          </a:extLst>
+        </p:spPr>
+      </p:pic>
     </p:spTree>
     <p:extLst>
       <p:ext uri="{BB962C8B-B14F-4D97-AF65-F5344CB8AC3E}">
         <p14:creationId xmlns:p14="http://schemas.microsoft.com/office/powerpoint/2010/main" val="2407103025"/>
+      </p:ext>
+    </p:extLst>
+  </p:cSld>
+  <p:clrMapOvr>
+    <a:masterClrMapping/>
+  </p:clrMapOvr>
+</p:sld>
+</file>
+
+<file path=ppt/slides/slide9.xml><?xml version="1.0" encoding="utf-8"?>
+<p:sld xmlns:a="http://schemas.openxmlformats.org/drawingml/2006/main" xmlns:r="http://schemas.openxmlformats.org/officeDocument/2006/relationships" xmlns:p="http://schemas.openxmlformats.org/presentationml/2006/main">
+  <p:cSld>
+    <p:spTree>
+      <p:nvGrpSpPr>
+        <p:cNvPr id="1" name=""/>
+        <p:cNvGrpSpPr/>
+        <p:nvPr/>
+      </p:nvGrpSpPr>
+      <p:grpSpPr>
+        <a:xfrm>
+          <a:off x="0" y="0"/>
+          <a:ext cx="0" cy="0"/>
+          <a:chOff x="0" y="0"/>
+          <a:chExt cx="0" cy="0"/>
+        </a:xfrm>
+      </p:grpSpPr>
+      <p:pic>
+        <p:nvPicPr>
+          <p:cNvPr id="2" name="Picture 2" descr="Kotlin Icon.svg">
+            <a:extLst>
+              <a:ext uri="{FF2B5EF4-FFF2-40B4-BE49-F238E27FC236}">
+                <a16:creationId xmlns:a16="http://schemas.microsoft.com/office/drawing/2014/main" id="{30D2BCDF-6A8C-453B-BC04-1C3B1B2C0A58}"/>
+              </a:ext>
+            </a:extLst>
+          </p:cNvPr>
+          <p:cNvPicPr>
+            <a:picLocks noChangeAspect="1" noChangeArrowheads="1"/>
+          </p:cNvPicPr>
+          <p:nvPr/>
+        </p:nvPicPr>
+        <p:blipFill>
+          <a:blip r:embed="rId2">
+            <a:extLst>
+              <a:ext uri="{28A0092B-C50C-407E-A947-70E740481C1C}">
+                <a14:useLocalDpi xmlns:a14="http://schemas.microsoft.com/office/drawing/2010/main" val="0"/>
+              </a:ext>
+            </a:extLst>
+          </a:blip>
+          <a:srcRect/>
+          <a:stretch>
+            <a:fillRect/>
+          </a:stretch>
+        </p:blipFill>
+        <p:spPr bwMode="auto">
+          <a:xfrm>
+            <a:off x="974360" y="1978702"/>
+            <a:ext cx="1900003" cy="1900003"/>
+          </a:xfrm>
+          <a:prstGeom prst="rect">
+            <a:avLst/>
+          </a:prstGeom>
+          <a:noFill/>
+          <a:extLst>
+            <a:ext uri="{909E8E84-426E-40DD-AFC4-6F175D3DCCD1}">
+              <a14:hiddenFill xmlns:a14="http://schemas.microsoft.com/office/drawing/2010/main">
+                <a:solidFill>
+                  <a:srgbClr val="FFFFFF"/>
+                </a:solidFill>
+              </a14:hiddenFill>
+            </a:ext>
+          </a:extLst>
+        </p:spPr>
+      </p:pic>
+      <p:sp>
+        <p:nvSpPr>
+          <p:cNvPr id="3" name="TextBox 2">
+            <a:extLst>
+              <a:ext uri="{FF2B5EF4-FFF2-40B4-BE49-F238E27FC236}">
+                <a16:creationId xmlns:a16="http://schemas.microsoft.com/office/drawing/2014/main" id="{0CDADB4E-741D-47A0-AC6B-530B20A1A1D9}"/>
+              </a:ext>
+            </a:extLst>
+          </p:cNvPr>
+          <p:cNvSpPr txBox="1"/>
+          <p:nvPr/>
+        </p:nvSpPr>
+        <p:spPr>
+          <a:xfrm>
+            <a:off x="3780158" y="370450"/>
+            <a:ext cx="7240250" cy="5632311"/>
+          </a:xfrm>
+          <a:prstGeom prst="rect">
+            <a:avLst/>
+          </a:prstGeom>
+          <a:noFill/>
+        </p:spPr>
+        <p:txBody>
+          <a:bodyPr wrap="square" rtlCol="0">
+            <a:spAutoFit/>
+          </a:bodyPr>
+          <a:lstStyle/>
+          <a:p>
+            <a:r>
+              <a:rPr lang="en-US" altLang="ko-KR" sz="2400" b="1" dirty="0">
+                <a:latin typeface="나눔고딕 ExtraBold" panose="020D0904000000000000" pitchFamily="50" charset="-127"/>
+                <a:ea typeface="나눔고딕 ExtraBold" panose="020D0904000000000000" pitchFamily="50" charset="-127"/>
+              </a:rPr>
+              <a:t>Android developers </a:t>
+            </a:r>
+            <a:r>
+              <a:rPr lang="ko-KR" altLang="en-US" sz="2400" b="1" dirty="0">
+                <a:latin typeface="나눔고딕 ExtraBold" panose="020D0904000000000000" pitchFamily="50" charset="-127"/>
+                <a:ea typeface="나눔고딕 ExtraBold" panose="020D0904000000000000" pitchFamily="50" charset="-127"/>
+              </a:rPr>
+              <a:t>사이트의 </a:t>
+            </a:r>
+            <a:r>
+              <a:rPr lang="en-US" altLang="ko-KR" sz="2400" b="1" dirty="0">
+                <a:latin typeface="나눔고딕 ExtraBold" panose="020D0904000000000000" pitchFamily="50" charset="-127"/>
+                <a:ea typeface="나눔고딕 ExtraBold" panose="020D0904000000000000" pitchFamily="50" charset="-127"/>
+              </a:rPr>
+              <a:t>Kotlin</a:t>
+            </a:r>
+            <a:r>
+              <a:rPr lang="ko-KR" altLang="en-US" sz="2400" b="1" dirty="0">
+                <a:latin typeface="나눔고딕 ExtraBold" panose="020D0904000000000000" pitchFamily="50" charset="-127"/>
+                <a:ea typeface="나눔고딕 ExtraBold" panose="020D0904000000000000" pitchFamily="50" charset="-127"/>
+              </a:rPr>
+              <a:t> 소개이다</a:t>
+            </a:r>
+            <a:r>
+              <a:rPr lang="en-US" altLang="ko-KR" sz="2400" b="1" dirty="0">
+                <a:latin typeface="나눔고딕 ExtraBold" panose="020D0904000000000000" pitchFamily="50" charset="-127"/>
+                <a:ea typeface="나눔고딕 ExtraBold" panose="020D0904000000000000" pitchFamily="50" charset="-127"/>
+              </a:rPr>
+              <a:t>.</a:t>
+            </a:r>
+          </a:p>
+          <a:p>
+            <a:endParaRPr lang="en-US" altLang="ko-KR" sz="2400" b="1" dirty="0">
+              <a:latin typeface="나눔고딕 ExtraBold" panose="020D0904000000000000" pitchFamily="50" charset="-127"/>
+              <a:ea typeface="나눔고딕 ExtraBold" panose="020D0904000000000000" pitchFamily="50" charset="-127"/>
+            </a:endParaRPr>
+          </a:p>
+          <a:p>
+            <a:r>
+              <a:rPr lang="ko-KR" altLang="en-US" sz="2400" b="1" dirty="0">
+                <a:latin typeface="나눔고딕 ExtraBold" panose="020D0904000000000000" pitchFamily="50" charset="-127"/>
+                <a:ea typeface="나눔고딕 ExtraBold" panose="020D0904000000000000" pitchFamily="50" charset="-127"/>
+              </a:rPr>
+              <a:t>표현력이 높고 간결하다</a:t>
+            </a:r>
+            <a:r>
+              <a:rPr lang="en-US" altLang="ko-KR" sz="2400" b="1" dirty="0">
+                <a:latin typeface="나눔고딕 ExtraBold" panose="020D0904000000000000" pitchFamily="50" charset="-127"/>
+                <a:ea typeface="나눔고딕 ExtraBold" panose="020D0904000000000000" pitchFamily="50" charset="-127"/>
+              </a:rPr>
+              <a:t>. </a:t>
+            </a:r>
+            <a:r>
+              <a:rPr lang="en-US" altLang="ko-KR" sz="2400" b="1" dirty="0">
+                <a:latin typeface="나눔고딕 ExtraBold" panose="020D0904000000000000" pitchFamily="50" charset="-127"/>
+                <a:ea typeface="나눔고딕 ExtraBold" panose="020D0904000000000000" pitchFamily="50" charset="-127"/>
+                <a:sym typeface="Wingdings" panose="05000000000000000000" pitchFamily="2" charset="2"/>
+              </a:rPr>
+              <a:t> </a:t>
+            </a:r>
+          </a:p>
+          <a:p>
+            <a:r>
+              <a:rPr lang="ko-KR" altLang="en-US" sz="2400" b="1" dirty="0">
+                <a:highlight>
+                  <a:srgbClr val="FFFF00"/>
+                </a:highlight>
+                <a:latin typeface="나눔고딕 ExtraBold" panose="020D0904000000000000" pitchFamily="50" charset="-127"/>
+                <a:ea typeface="나눔고딕 ExtraBold" panose="020D0904000000000000" pitchFamily="50" charset="-127"/>
+                <a:sym typeface="Wingdings" panose="05000000000000000000" pitchFamily="2" charset="2"/>
+              </a:rPr>
+              <a:t>최신 언어 기능을 통해 간략한 작성이 가능</a:t>
+            </a:r>
+            <a:endParaRPr lang="en-US" altLang="ko-KR" sz="2400" b="1" dirty="0">
+              <a:highlight>
+                <a:srgbClr val="FFFF00"/>
+              </a:highlight>
+              <a:latin typeface="나눔고딕 ExtraBold" panose="020D0904000000000000" pitchFamily="50" charset="-127"/>
+              <a:ea typeface="나눔고딕 ExtraBold" panose="020D0904000000000000" pitchFamily="50" charset="-127"/>
+              <a:sym typeface="Wingdings" panose="05000000000000000000" pitchFamily="2" charset="2"/>
+            </a:endParaRPr>
+          </a:p>
+          <a:p>
+            <a:endParaRPr lang="en-US" altLang="ko-KR" sz="2400" b="1" dirty="0">
+              <a:latin typeface="나눔고딕 ExtraBold" panose="020D0904000000000000" pitchFamily="50" charset="-127"/>
+              <a:ea typeface="나눔고딕 ExtraBold" panose="020D0904000000000000" pitchFamily="50" charset="-127"/>
+              <a:sym typeface="Wingdings" panose="05000000000000000000" pitchFamily="2" charset="2"/>
+            </a:endParaRPr>
+          </a:p>
+          <a:p>
+            <a:r>
+              <a:rPr lang="ko-KR" altLang="en-US" sz="2400" b="1" dirty="0">
+                <a:latin typeface="나눔고딕 ExtraBold" panose="020D0904000000000000" pitchFamily="50" charset="-127"/>
+                <a:ea typeface="나눔고딕 ExtraBold" panose="020D0904000000000000" pitchFamily="50" charset="-127"/>
+                <a:sym typeface="Wingdings" panose="05000000000000000000" pitchFamily="2" charset="2"/>
+              </a:rPr>
+              <a:t>더 안전한 코드 </a:t>
+            </a:r>
+            <a:r>
+              <a:rPr lang="en-US" altLang="ko-KR" sz="2400" b="1" dirty="0">
+                <a:latin typeface="나눔고딕 ExtraBold" panose="020D0904000000000000" pitchFamily="50" charset="-127"/>
+                <a:ea typeface="나눔고딕 ExtraBold" panose="020D0904000000000000" pitchFamily="50" charset="-127"/>
+                <a:sym typeface="Wingdings" panose="05000000000000000000" pitchFamily="2" charset="2"/>
+              </a:rPr>
+              <a:t> </a:t>
+            </a:r>
+          </a:p>
+          <a:p>
+            <a:r>
+              <a:rPr lang="en-US" altLang="ko-KR" sz="2400" b="1" dirty="0">
+                <a:highlight>
+                  <a:srgbClr val="FFFF00"/>
+                </a:highlight>
+                <a:latin typeface="나눔고딕 ExtraBold" panose="020D0904000000000000" pitchFamily="50" charset="-127"/>
+                <a:ea typeface="나눔고딕 ExtraBold" panose="020D0904000000000000" pitchFamily="50" charset="-127"/>
+                <a:sym typeface="Wingdings" panose="05000000000000000000" pitchFamily="2" charset="2"/>
+              </a:rPr>
+              <a:t>NPE</a:t>
+            </a:r>
+            <a:r>
+              <a:rPr lang="ko-KR" altLang="en-US" sz="2400" b="1" dirty="0">
+                <a:highlight>
+                  <a:srgbClr val="FFFF00"/>
+                </a:highlight>
+                <a:latin typeface="나눔고딕 ExtraBold" panose="020D0904000000000000" pitchFamily="50" charset="-127"/>
+                <a:ea typeface="나눔고딕 ExtraBold" panose="020D0904000000000000" pitchFamily="50" charset="-127"/>
+                <a:sym typeface="Wingdings" panose="05000000000000000000" pitchFamily="2" charset="2"/>
+              </a:rPr>
+              <a:t>에 안전하고</a:t>
+            </a:r>
+            <a:r>
+              <a:rPr lang="en-US" altLang="ko-KR" sz="2400" b="1" dirty="0">
+                <a:highlight>
+                  <a:srgbClr val="FFFF00"/>
+                </a:highlight>
+                <a:latin typeface="나눔고딕 ExtraBold" panose="020D0904000000000000" pitchFamily="50" charset="-127"/>
+                <a:ea typeface="나눔고딕 ExtraBold" panose="020D0904000000000000" pitchFamily="50" charset="-127"/>
+                <a:sym typeface="Wingdings" panose="05000000000000000000" pitchFamily="2" charset="2"/>
+              </a:rPr>
+              <a:t>, </a:t>
+            </a:r>
+            <a:r>
+              <a:rPr lang="ko-KR" altLang="en-US" sz="2400" b="1" dirty="0">
+                <a:highlight>
+                  <a:srgbClr val="FFFF00"/>
+                </a:highlight>
+                <a:latin typeface="나눔고딕 ExtraBold" panose="020D0904000000000000" pitchFamily="50" charset="-127"/>
+                <a:ea typeface="나눔고딕 ExtraBold" panose="020D0904000000000000" pitchFamily="50" charset="-127"/>
+                <a:sym typeface="Wingdings" panose="05000000000000000000" pitchFamily="2" charset="2"/>
+              </a:rPr>
+              <a:t>앱이 다운될 확률이 </a:t>
+            </a:r>
+            <a:r>
+              <a:rPr lang="en-US" altLang="ko-KR" sz="2400" b="1" dirty="0">
+                <a:highlight>
+                  <a:srgbClr val="FFFF00"/>
+                </a:highlight>
+                <a:latin typeface="나눔고딕 ExtraBold" panose="020D0904000000000000" pitchFamily="50" charset="-127"/>
+                <a:ea typeface="나눔고딕 ExtraBold" panose="020D0904000000000000" pitchFamily="50" charset="-127"/>
+                <a:sym typeface="Wingdings" panose="05000000000000000000" pitchFamily="2" charset="2"/>
+              </a:rPr>
+              <a:t>20%</a:t>
+            </a:r>
+            <a:r>
+              <a:rPr lang="ko-KR" altLang="en-US" sz="2400" b="1" dirty="0">
+                <a:highlight>
+                  <a:srgbClr val="FFFF00"/>
+                </a:highlight>
+                <a:latin typeface="나눔고딕 ExtraBold" panose="020D0904000000000000" pitchFamily="50" charset="-127"/>
+                <a:ea typeface="나눔고딕 ExtraBold" panose="020D0904000000000000" pitchFamily="50" charset="-127"/>
+                <a:sym typeface="Wingdings" panose="05000000000000000000" pitchFamily="2" charset="2"/>
+              </a:rPr>
+              <a:t>이상 낮아진다</a:t>
+            </a:r>
+            <a:r>
+              <a:rPr lang="en-US" altLang="ko-KR" sz="2400" b="1" dirty="0">
+                <a:highlight>
+                  <a:srgbClr val="FFFF00"/>
+                </a:highlight>
+                <a:latin typeface="나눔고딕 ExtraBold" panose="020D0904000000000000" pitchFamily="50" charset="-127"/>
+                <a:ea typeface="나눔고딕 ExtraBold" panose="020D0904000000000000" pitchFamily="50" charset="-127"/>
+                <a:sym typeface="Wingdings" panose="05000000000000000000" pitchFamily="2" charset="2"/>
+              </a:rPr>
+              <a:t>.</a:t>
+            </a:r>
+          </a:p>
+          <a:p>
+            <a:endParaRPr lang="en-US" altLang="ko-KR" sz="2400" b="1" dirty="0">
+              <a:latin typeface="나눔고딕 ExtraBold" panose="020D0904000000000000" pitchFamily="50" charset="-127"/>
+              <a:ea typeface="나눔고딕 ExtraBold" panose="020D0904000000000000" pitchFamily="50" charset="-127"/>
+              <a:sym typeface="Wingdings" panose="05000000000000000000" pitchFamily="2" charset="2"/>
+            </a:endParaRPr>
+          </a:p>
+          <a:p>
+            <a:r>
+              <a:rPr lang="ko-KR" altLang="en-US" sz="2400" b="1" dirty="0">
+                <a:latin typeface="나눔고딕 ExtraBold" panose="020D0904000000000000" pitchFamily="50" charset="-127"/>
+                <a:ea typeface="나눔고딕 ExtraBold" panose="020D0904000000000000" pitchFamily="50" charset="-127"/>
+                <a:sym typeface="Wingdings" panose="05000000000000000000" pitchFamily="2" charset="2"/>
+              </a:rPr>
+              <a:t>상호운용 가능 </a:t>
+            </a:r>
+            <a:r>
+              <a:rPr lang="en-US" altLang="ko-KR" sz="2400" b="1" dirty="0">
+                <a:latin typeface="나눔고딕 ExtraBold" panose="020D0904000000000000" pitchFamily="50" charset="-127"/>
+                <a:ea typeface="나눔고딕 ExtraBold" panose="020D0904000000000000" pitchFamily="50" charset="-127"/>
+                <a:sym typeface="Wingdings" panose="05000000000000000000" pitchFamily="2" charset="2"/>
+              </a:rPr>
+              <a:t> </a:t>
+            </a:r>
+          </a:p>
+          <a:p>
+            <a:r>
+              <a:rPr lang="ko-KR" altLang="en-US" sz="2400" b="1" dirty="0">
+                <a:highlight>
+                  <a:srgbClr val="FFFF00"/>
+                </a:highlight>
+                <a:latin typeface="나눔고딕 ExtraBold" panose="020D0904000000000000" pitchFamily="50" charset="-127"/>
+                <a:ea typeface="나눔고딕 ExtraBold" panose="020D0904000000000000" pitchFamily="50" charset="-127"/>
+              </a:rPr>
+              <a:t>사실 </a:t>
+            </a:r>
+            <a:r>
+              <a:rPr lang="en-US" altLang="ko-KR" sz="2400" b="1" dirty="0">
+                <a:highlight>
+                  <a:srgbClr val="FFFF00"/>
+                </a:highlight>
+                <a:latin typeface="나눔고딕 ExtraBold" panose="020D0904000000000000" pitchFamily="50" charset="-127"/>
+                <a:ea typeface="나눔고딕 ExtraBold" panose="020D0904000000000000" pitchFamily="50" charset="-127"/>
+              </a:rPr>
+              <a:t>Kotlin</a:t>
+            </a:r>
+            <a:r>
+              <a:rPr lang="ko-KR" altLang="en-US" sz="2400" b="1" dirty="0">
+                <a:highlight>
+                  <a:srgbClr val="FFFF00"/>
+                </a:highlight>
+                <a:latin typeface="나눔고딕 ExtraBold" panose="020D0904000000000000" pitchFamily="50" charset="-127"/>
+                <a:ea typeface="나눔고딕 ExtraBold" panose="020D0904000000000000" pitchFamily="50" charset="-127"/>
+              </a:rPr>
+              <a:t>은 </a:t>
+            </a:r>
+            <a:r>
+              <a:rPr lang="en-US" altLang="ko-KR" sz="2400" b="1" dirty="0">
+                <a:highlight>
+                  <a:srgbClr val="FFFF00"/>
+                </a:highlight>
+                <a:latin typeface="나눔고딕 ExtraBold" panose="020D0904000000000000" pitchFamily="50" charset="-127"/>
+                <a:ea typeface="나눔고딕 ExtraBold" panose="020D0904000000000000" pitchFamily="50" charset="-127"/>
+              </a:rPr>
+              <a:t>Java</a:t>
+            </a:r>
+            <a:r>
+              <a:rPr lang="ko-KR" altLang="en-US" sz="2400" b="1" dirty="0">
+                <a:highlight>
+                  <a:srgbClr val="FFFF00"/>
+                </a:highlight>
+                <a:latin typeface="나눔고딕 ExtraBold" panose="020D0904000000000000" pitchFamily="50" charset="-127"/>
+                <a:ea typeface="나눔고딕 ExtraBold" panose="020D0904000000000000" pitchFamily="50" charset="-127"/>
+              </a:rPr>
+              <a:t>와 </a:t>
+            </a:r>
+            <a:r>
+              <a:rPr lang="en-US" altLang="ko-KR" sz="2400" b="1" dirty="0">
+                <a:highlight>
+                  <a:srgbClr val="FFFF00"/>
+                </a:highlight>
+                <a:latin typeface="나눔고딕 ExtraBold" panose="020D0904000000000000" pitchFamily="50" charset="-127"/>
+                <a:ea typeface="나눔고딕 ExtraBold" panose="020D0904000000000000" pitchFamily="50" charset="-127"/>
+              </a:rPr>
+              <a:t>100% </a:t>
+            </a:r>
+            <a:r>
+              <a:rPr lang="ko-KR" altLang="en-US" sz="2400" b="1" dirty="0">
+                <a:highlight>
+                  <a:srgbClr val="FFFF00"/>
+                </a:highlight>
+                <a:latin typeface="나눔고딕 ExtraBold" panose="020D0904000000000000" pitchFamily="50" charset="-127"/>
+                <a:ea typeface="나눔고딕 ExtraBold" panose="020D0904000000000000" pitchFamily="50" charset="-127"/>
+              </a:rPr>
+              <a:t>호환된다</a:t>
+            </a:r>
+            <a:r>
+              <a:rPr lang="en-US" altLang="ko-KR" sz="2400" b="1" dirty="0">
+                <a:highlight>
+                  <a:srgbClr val="FFFF00"/>
+                </a:highlight>
+                <a:latin typeface="나눔고딕 ExtraBold" panose="020D0904000000000000" pitchFamily="50" charset="-127"/>
+                <a:ea typeface="나눔고딕 ExtraBold" panose="020D0904000000000000" pitchFamily="50" charset="-127"/>
+              </a:rPr>
+              <a:t>.</a:t>
+            </a:r>
+          </a:p>
+          <a:p>
+            <a:endParaRPr lang="en-US" altLang="ko-KR" sz="2400" b="1" dirty="0">
+              <a:latin typeface="나눔고딕 ExtraBold" panose="020D0904000000000000" pitchFamily="50" charset="-127"/>
+              <a:ea typeface="나눔고딕 ExtraBold" panose="020D0904000000000000" pitchFamily="50" charset="-127"/>
+            </a:endParaRPr>
+          </a:p>
+          <a:p>
+            <a:r>
+              <a:rPr lang="ko-KR" altLang="en-US" sz="2400" b="1" dirty="0">
+                <a:latin typeface="나눔고딕 ExtraBold" panose="020D0904000000000000" pitchFamily="50" charset="-127"/>
+                <a:ea typeface="나눔고딕 ExtraBold" panose="020D0904000000000000" pitchFamily="50" charset="-127"/>
+              </a:rPr>
+              <a:t>구조화된 동시 실행 </a:t>
+            </a:r>
+            <a:r>
+              <a:rPr lang="en-US" altLang="ko-KR" sz="2400" b="1" dirty="0">
+                <a:latin typeface="나눔고딕 ExtraBold" panose="020D0904000000000000" pitchFamily="50" charset="-127"/>
+                <a:ea typeface="나눔고딕 ExtraBold" panose="020D0904000000000000" pitchFamily="50" charset="-127"/>
+                <a:sym typeface="Wingdings" panose="05000000000000000000" pitchFamily="2" charset="2"/>
+              </a:rPr>
+              <a:t> </a:t>
+            </a:r>
+          </a:p>
+          <a:p>
+            <a:r>
+              <a:rPr lang="en-US" altLang="ko-KR" sz="2400" b="1" dirty="0">
+                <a:highlight>
+                  <a:srgbClr val="FFFF00"/>
+                </a:highlight>
+                <a:latin typeface="나눔고딕 ExtraBold" panose="020D0904000000000000" pitchFamily="50" charset="-127"/>
+                <a:ea typeface="나눔고딕 ExtraBold" panose="020D0904000000000000" pitchFamily="50" charset="-127"/>
+                <a:sym typeface="Wingdings" panose="05000000000000000000" pitchFamily="2" charset="2"/>
+              </a:rPr>
+              <a:t>Kotlin Coroutine</a:t>
+            </a:r>
+            <a:r>
+              <a:rPr lang="ko-KR" altLang="en-US" sz="2400" b="1" dirty="0">
+                <a:highlight>
+                  <a:srgbClr val="FFFF00"/>
+                </a:highlight>
+                <a:latin typeface="나눔고딕 ExtraBold" panose="020D0904000000000000" pitchFamily="50" charset="-127"/>
+                <a:ea typeface="나눔고딕 ExtraBold" panose="020D0904000000000000" pitchFamily="50" charset="-127"/>
+                <a:sym typeface="Wingdings" panose="05000000000000000000" pitchFamily="2" charset="2"/>
+              </a:rPr>
+              <a:t>을 사용해 비동기 처리와 서버 통신이 더 쉬워진다</a:t>
+            </a:r>
+            <a:r>
+              <a:rPr lang="en-US" altLang="ko-KR" sz="2400" b="1" dirty="0">
+                <a:highlight>
+                  <a:srgbClr val="FFFF00"/>
+                </a:highlight>
+                <a:latin typeface="나눔고딕 ExtraBold" panose="020D0904000000000000" pitchFamily="50" charset="-127"/>
+                <a:ea typeface="나눔고딕 ExtraBold" panose="020D0904000000000000" pitchFamily="50" charset="-127"/>
+                <a:sym typeface="Wingdings" panose="05000000000000000000" pitchFamily="2" charset="2"/>
+              </a:rPr>
+              <a:t>.</a:t>
+            </a:r>
+            <a:endParaRPr lang="en-US" altLang="ko-KR" sz="2400" b="1" dirty="0">
+              <a:highlight>
+                <a:srgbClr val="FFFF00"/>
+              </a:highlight>
+              <a:latin typeface="나눔고딕 ExtraBold" panose="020D0904000000000000" pitchFamily="50" charset="-127"/>
+              <a:ea typeface="나눔고딕 ExtraBold" panose="020D0904000000000000" pitchFamily="50" charset="-127"/>
+            </a:endParaRPr>
+          </a:p>
+        </p:txBody>
+      </p:sp>
+    </p:spTree>
+    <p:extLst>
+      <p:ext uri="{BB962C8B-B14F-4D97-AF65-F5344CB8AC3E}">
+        <p14:creationId xmlns:p14="http://schemas.microsoft.com/office/powerpoint/2010/main" val="1447293889"/>
       </p:ext>
     </p:extLst>
   </p:cSld>

</xml_diff>